<commit_message>
4/4 My Everyday Learning added
</commit_message>
<xml_diff>
--- a/DESIGN PATTERN C++.pptx
+++ b/DESIGN PATTERN C++.pptx
@@ -15,6 +15,9 @@
     <p:sldId id="263" r:id="rId9"/>
     <p:sldId id="264" r:id="rId10"/>
     <p:sldId id="265" r:id="rId11"/>
+    <p:sldId id="266" r:id="rId12"/>
+    <p:sldId id="267" r:id="rId13"/>
+    <p:sldId id="268" r:id="rId14"/>
   </p:sldIdLst>
   <p:sldSz cx="12192000" cy="6858000"/>
   <p:notesSz cx="6858000" cy="9144000"/>
@@ -623,7 +626,7 @@
           <a:p>
             <a:fld id="{B0A285C1-DF51-4B44-A09F-C5C3026ED7A4}" type="datetimeFigureOut">
               <a:rPr lang="en-US" smtClean="0"/>
-              <a:t>3/29/2023</a:t>
+              <a:t>4/2/2023</a:t>
             </a:fld>
             <a:endParaRPr lang="en-US"/>
           </a:p>
@@ -919,7 +922,7 @@
           <a:p>
             <a:fld id="{B0A285C1-DF51-4B44-A09F-C5C3026ED7A4}" type="datetimeFigureOut">
               <a:rPr lang="en-US" smtClean="0"/>
-              <a:t>3/29/2023</a:t>
+              <a:t>4/2/2023</a:t>
             </a:fld>
             <a:endParaRPr lang="en-US"/>
           </a:p>
@@ -1167,7 +1170,7 @@
           <a:p>
             <a:fld id="{B0A285C1-DF51-4B44-A09F-C5C3026ED7A4}" type="datetimeFigureOut">
               <a:rPr lang="en-US" smtClean="0"/>
-              <a:t>3/29/2023</a:t>
+              <a:t>4/2/2023</a:t>
             </a:fld>
             <a:endParaRPr lang="en-US"/>
           </a:p>
@@ -1707,7 +1710,7 @@
           <a:p>
             <a:fld id="{B0A285C1-DF51-4B44-A09F-C5C3026ED7A4}" type="datetimeFigureOut">
               <a:rPr lang="en-US" smtClean="0"/>
-              <a:t>3/29/2023</a:t>
+              <a:t>4/2/2023</a:t>
             </a:fld>
             <a:endParaRPr lang="en-US"/>
           </a:p>
@@ -1955,7 +1958,7 @@
           <a:p>
             <a:fld id="{B0A285C1-DF51-4B44-A09F-C5C3026ED7A4}" type="datetimeFigureOut">
               <a:rPr lang="en-US" smtClean="0"/>
-              <a:t>3/29/2023</a:t>
+              <a:t>4/2/2023</a:t>
             </a:fld>
             <a:endParaRPr lang="en-US"/>
           </a:p>
@@ -2487,7 +2490,7 @@
           <a:p>
             <a:fld id="{B0A285C1-DF51-4B44-A09F-C5C3026ED7A4}" type="datetimeFigureOut">
               <a:rPr lang="en-US" smtClean="0"/>
-              <a:t>3/29/2023</a:t>
+              <a:t>4/2/2023</a:t>
             </a:fld>
             <a:endParaRPr lang="en-US"/>
           </a:p>
@@ -2784,7 +2787,7 @@
           <a:p>
             <a:fld id="{B0A285C1-DF51-4B44-A09F-C5C3026ED7A4}" type="datetimeFigureOut">
               <a:rPr lang="en-US" smtClean="0"/>
-              <a:t>3/29/2023</a:t>
+              <a:t>4/2/2023</a:t>
             </a:fld>
             <a:endParaRPr lang="en-US"/>
           </a:p>
@@ -2958,7 +2961,7 @@
           <a:p>
             <a:fld id="{B0A285C1-DF51-4B44-A09F-C5C3026ED7A4}" type="datetimeFigureOut">
               <a:rPr lang="en-US" smtClean="0"/>
-              <a:t>3/29/2023</a:t>
+              <a:t>4/2/2023</a:t>
             </a:fld>
             <a:endParaRPr lang="en-US"/>
           </a:p>
@@ -3138,7 +3141,7 @@
           <a:p>
             <a:fld id="{B0A285C1-DF51-4B44-A09F-C5C3026ED7A4}" type="datetimeFigureOut">
               <a:rPr lang="en-US" smtClean="0"/>
-              <a:t>3/29/2023</a:t>
+              <a:t>4/2/2023</a:t>
             </a:fld>
             <a:endParaRPr lang="en-US"/>
           </a:p>
@@ -3308,7 +3311,7 @@
           <a:p>
             <a:fld id="{B0A285C1-DF51-4B44-A09F-C5C3026ED7A4}" type="datetimeFigureOut">
               <a:rPr lang="en-US" smtClean="0"/>
-              <a:t>3/29/2023</a:t>
+              <a:t>4/2/2023</a:t>
             </a:fld>
             <a:endParaRPr lang="en-US"/>
           </a:p>
@@ -3559,7 +3562,7 @@
           <a:p>
             <a:fld id="{B0A285C1-DF51-4B44-A09F-C5C3026ED7A4}" type="datetimeFigureOut">
               <a:rPr lang="en-US" smtClean="0"/>
-              <a:t>3/29/2023</a:t>
+              <a:t>4/2/2023</a:t>
             </a:fld>
             <a:endParaRPr lang="en-US"/>
           </a:p>
@@ -3856,7 +3859,7 @@
           <a:p>
             <a:fld id="{B0A285C1-DF51-4B44-A09F-C5C3026ED7A4}" type="datetimeFigureOut">
               <a:rPr lang="en-US" smtClean="0"/>
-              <a:t>3/29/2023</a:t>
+              <a:t>4/2/2023</a:t>
             </a:fld>
             <a:endParaRPr lang="en-US"/>
           </a:p>
@@ -4298,7 +4301,7 @@
           <a:p>
             <a:fld id="{B0A285C1-DF51-4B44-A09F-C5C3026ED7A4}" type="datetimeFigureOut">
               <a:rPr lang="en-US" smtClean="0"/>
-              <a:t>3/29/2023</a:t>
+              <a:t>4/2/2023</a:t>
             </a:fld>
             <a:endParaRPr lang="en-US"/>
           </a:p>
@@ -4416,7 +4419,7 @@
           <a:p>
             <a:fld id="{B0A285C1-DF51-4B44-A09F-C5C3026ED7A4}" type="datetimeFigureOut">
               <a:rPr lang="en-US" smtClean="0"/>
-              <a:t>3/29/2023</a:t>
+              <a:t>4/2/2023</a:t>
             </a:fld>
             <a:endParaRPr lang="en-US"/>
           </a:p>
@@ -4511,7 +4514,7 @@
           <a:p>
             <a:fld id="{B0A285C1-DF51-4B44-A09F-C5C3026ED7A4}" type="datetimeFigureOut">
               <a:rPr lang="en-US" smtClean="0"/>
-              <a:t>3/29/2023</a:t>
+              <a:t>4/2/2023</a:t>
             </a:fld>
             <a:endParaRPr lang="en-US"/>
           </a:p>
@@ -4794,7 +4797,7 @@
           <a:p>
             <a:fld id="{B0A285C1-DF51-4B44-A09F-C5C3026ED7A4}" type="datetimeFigureOut">
               <a:rPr lang="en-US" smtClean="0"/>
-              <a:t>3/29/2023</a:t>
+              <a:t>4/2/2023</a:t>
             </a:fld>
             <a:endParaRPr lang="en-US"/>
           </a:p>
@@ -5085,7 +5088,7 @@
           <a:p>
             <a:fld id="{B0A285C1-DF51-4B44-A09F-C5C3026ED7A4}" type="datetimeFigureOut">
               <a:rPr lang="en-US" smtClean="0"/>
-              <a:t>3/29/2023</a:t>
+              <a:t>4/2/2023</a:t>
             </a:fld>
             <a:endParaRPr lang="en-US"/>
           </a:p>
@@ -5615,7 +5618,7 @@
           <a:p>
             <a:fld id="{B0A285C1-DF51-4B44-A09F-C5C3026ED7A4}" type="datetimeFigureOut">
               <a:rPr lang="en-US" smtClean="0"/>
-              <a:t>3/29/2023</a:t>
+              <a:t>4/2/2023</a:t>
             </a:fld>
             <a:endParaRPr lang="en-US"/>
           </a:p>
@@ -6290,6 +6293,2920 @@
 </p:sld>
 </file>
 
+<file path=ppt/slides/slide11.xml><?xml version="1.0" encoding="utf-8"?>
+<p:sld xmlns:a="http://schemas.openxmlformats.org/drawingml/2006/main" xmlns:r="http://schemas.openxmlformats.org/officeDocument/2006/relationships" xmlns:p="http://schemas.openxmlformats.org/presentationml/2006/main">
+  <p:cSld>
+    <p:spTree>
+      <p:nvGrpSpPr>
+        <p:cNvPr id="1" name=""/>
+        <p:cNvGrpSpPr/>
+        <p:nvPr/>
+      </p:nvGrpSpPr>
+      <p:grpSpPr>
+        <a:xfrm>
+          <a:off x="0" y="0"/>
+          <a:ext cx="0" cy="0"/>
+          <a:chOff x="0" y="0"/>
+          <a:chExt cx="0" cy="0"/>
+        </a:xfrm>
+      </p:grpSpPr>
+      <p:sp>
+        <p:nvSpPr>
+          <p:cNvPr id="2" name="Title 1">
+            <a:extLst>
+              <a:ext uri="{FF2B5EF4-FFF2-40B4-BE49-F238E27FC236}">
+                <a16:creationId xmlns:a16="http://schemas.microsoft.com/office/drawing/2014/main" id="{07072C0C-9031-49A0-AA97-42979A93546A}"/>
+              </a:ext>
+            </a:extLst>
+          </p:cNvPr>
+          <p:cNvSpPr>
+            <a:spLocks noGrp="1"/>
+          </p:cNvSpPr>
+          <p:nvPr>
+            <p:ph type="title"/>
+          </p:nvPr>
+        </p:nvSpPr>
+        <p:spPr>
+          <a:xfrm>
+            <a:off x="1563333" y="381000"/>
+            <a:ext cx="10018713" cy="1752599"/>
+          </a:xfrm>
+        </p:spPr>
+        <p:txBody>
+          <a:bodyPr/>
+          <a:lstStyle/>
+          <a:p>
+            <a:r>
+              <a:rPr lang="en-US" dirty="0"/>
+              <a:t>FACTORY DESIGN PATTERN</a:t>
+            </a:r>
+          </a:p>
+        </p:txBody>
+      </p:sp>
+      <p:sp>
+        <p:nvSpPr>
+          <p:cNvPr id="3" name="Content Placeholder 2">
+            <a:extLst>
+              <a:ext uri="{FF2B5EF4-FFF2-40B4-BE49-F238E27FC236}">
+                <a16:creationId xmlns:a16="http://schemas.microsoft.com/office/drawing/2014/main" id="{FD283D07-E2B0-4AC9-8BC9-6E3C80CC83E4}"/>
+              </a:ext>
+            </a:extLst>
+          </p:cNvPr>
+          <p:cNvSpPr>
+            <a:spLocks noGrp="1"/>
+          </p:cNvSpPr>
+          <p:nvPr>
+            <p:ph idx="1"/>
+          </p:nvPr>
+        </p:nvSpPr>
+        <p:spPr>
+          <a:xfrm>
+            <a:off x="1755243" y="1978377"/>
+            <a:ext cx="10018713" cy="4038601"/>
+          </a:xfrm>
+        </p:spPr>
+        <p:txBody>
+          <a:bodyPr>
+            <a:normAutofit fontScale="77500" lnSpcReduction="20000"/>
+          </a:bodyPr>
+          <a:lstStyle/>
+          <a:p>
+            <a:pPr algn="just"/>
+            <a:r>
+              <a:rPr lang="en-US" dirty="0">
+                <a:latin typeface="Times New Roman" panose="02020603050405020304" pitchFamily="18" charset="0"/>
+                <a:cs typeface="Times New Roman" panose="02020603050405020304" pitchFamily="18" charset="0"/>
+              </a:rPr>
+              <a:t>Factory Design Pattern đ</a:t>
+            </a:r>
+            <a:r>
+              <a:rPr lang="vi-VN" dirty="0">
+                <a:latin typeface="Times New Roman" panose="02020603050405020304" pitchFamily="18" charset="0"/>
+                <a:cs typeface="Times New Roman" panose="02020603050405020304" pitchFamily="18" charset="0"/>
+              </a:rPr>
+              <a:t>ư</a:t>
+            </a:r>
+            <a:r>
+              <a:rPr lang="en-US" dirty="0" err="1">
+                <a:latin typeface="Times New Roman" panose="02020603050405020304" pitchFamily="18" charset="0"/>
+                <a:cs typeface="Times New Roman" panose="02020603050405020304" pitchFamily="18" charset="0"/>
+              </a:rPr>
+              <a:t>ợc</a:t>
+            </a:r>
+            <a:r>
+              <a:rPr lang="en-US" dirty="0">
+                <a:latin typeface="Times New Roman" panose="02020603050405020304" pitchFamily="18" charset="0"/>
+                <a:cs typeface="Times New Roman" panose="02020603050405020304" pitchFamily="18" charset="0"/>
+              </a:rPr>
+              <a:t> </a:t>
+            </a:r>
+            <a:r>
+              <a:rPr lang="en-US" dirty="0" err="1">
+                <a:latin typeface="Times New Roman" panose="02020603050405020304" pitchFamily="18" charset="0"/>
+                <a:cs typeface="Times New Roman" panose="02020603050405020304" pitchFamily="18" charset="0"/>
+              </a:rPr>
+              <a:t>dùng</a:t>
+            </a:r>
+            <a:r>
+              <a:rPr lang="en-US" dirty="0">
+                <a:latin typeface="Times New Roman" panose="02020603050405020304" pitchFamily="18" charset="0"/>
+                <a:cs typeface="Times New Roman" panose="02020603050405020304" pitchFamily="18" charset="0"/>
+              </a:rPr>
+              <a:t> </a:t>
+            </a:r>
+            <a:r>
+              <a:rPr lang="en-US" dirty="0" err="1">
+                <a:latin typeface="Times New Roman" panose="02020603050405020304" pitchFamily="18" charset="0"/>
+                <a:cs typeface="Times New Roman" panose="02020603050405020304" pitchFamily="18" charset="0"/>
+              </a:rPr>
+              <a:t>để</a:t>
+            </a:r>
+            <a:r>
+              <a:rPr lang="en-US" dirty="0">
+                <a:latin typeface="Times New Roman" panose="02020603050405020304" pitchFamily="18" charset="0"/>
+                <a:cs typeface="Times New Roman" panose="02020603050405020304" pitchFamily="18" charset="0"/>
+              </a:rPr>
+              <a:t> </a:t>
+            </a:r>
+            <a:r>
+              <a:rPr lang="en-US" dirty="0" err="1">
+                <a:latin typeface="Times New Roman" panose="02020603050405020304" pitchFamily="18" charset="0"/>
+                <a:cs typeface="Times New Roman" panose="02020603050405020304" pitchFamily="18" charset="0"/>
+              </a:rPr>
+              <a:t>mô</a:t>
+            </a:r>
+            <a:r>
+              <a:rPr lang="en-US" dirty="0">
+                <a:latin typeface="Times New Roman" panose="02020603050405020304" pitchFamily="18" charset="0"/>
+                <a:cs typeface="Times New Roman" panose="02020603050405020304" pitchFamily="18" charset="0"/>
+              </a:rPr>
+              <a:t> </a:t>
+            </a:r>
+            <a:r>
+              <a:rPr lang="en-US" dirty="0" err="1">
+                <a:latin typeface="Times New Roman" panose="02020603050405020304" pitchFamily="18" charset="0"/>
+                <a:cs typeface="Times New Roman" panose="02020603050405020304" pitchFamily="18" charset="0"/>
+              </a:rPr>
+              <a:t>tả</a:t>
+            </a:r>
+            <a:r>
+              <a:rPr lang="en-US" dirty="0">
+                <a:latin typeface="Times New Roman" panose="02020603050405020304" pitchFamily="18" charset="0"/>
+                <a:cs typeface="Times New Roman" panose="02020603050405020304" pitchFamily="18" charset="0"/>
+              </a:rPr>
+              <a:t> </a:t>
+            </a:r>
+            <a:r>
+              <a:rPr lang="en-US" dirty="0" err="1">
+                <a:latin typeface="Times New Roman" panose="02020603050405020304" pitchFamily="18" charset="0"/>
+                <a:cs typeface="Times New Roman" panose="02020603050405020304" pitchFamily="18" charset="0"/>
+              </a:rPr>
+              <a:t>một</a:t>
+            </a:r>
+            <a:r>
+              <a:rPr lang="en-US" dirty="0">
+                <a:latin typeface="Times New Roman" panose="02020603050405020304" pitchFamily="18" charset="0"/>
+                <a:cs typeface="Times New Roman" panose="02020603050405020304" pitchFamily="18" charset="0"/>
+              </a:rPr>
+              <a:t> </a:t>
+            </a:r>
+            <a:r>
+              <a:rPr lang="en-US" dirty="0" err="1">
+                <a:latin typeface="Times New Roman" panose="02020603050405020304" pitchFamily="18" charset="0"/>
+                <a:cs typeface="Times New Roman" panose="02020603050405020304" pitchFamily="18" charset="0"/>
+              </a:rPr>
+              <a:t>nhóm</a:t>
+            </a:r>
+            <a:r>
+              <a:rPr lang="en-US" dirty="0">
+                <a:latin typeface="Times New Roman" panose="02020603050405020304" pitchFamily="18" charset="0"/>
+                <a:cs typeface="Times New Roman" panose="02020603050405020304" pitchFamily="18" charset="0"/>
+              </a:rPr>
+              <a:t> </a:t>
+            </a:r>
+            <a:r>
+              <a:rPr lang="en-US" dirty="0" err="1">
+                <a:latin typeface="Times New Roman" panose="02020603050405020304" pitchFamily="18" charset="0"/>
+                <a:cs typeface="Times New Roman" panose="02020603050405020304" pitchFamily="18" charset="0"/>
+              </a:rPr>
+              <a:t>đối</a:t>
+            </a:r>
+            <a:r>
+              <a:rPr lang="en-US" dirty="0">
+                <a:latin typeface="Times New Roman" panose="02020603050405020304" pitchFamily="18" charset="0"/>
+                <a:cs typeface="Times New Roman" panose="02020603050405020304" pitchFamily="18" charset="0"/>
+              </a:rPr>
+              <a:t> t</a:t>
+            </a:r>
+            <a:r>
+              <a:rPr lang="vi-VN" dirty="0">
+                <a:latin typeface="Times New Roman" panose="02020603050405020304" pitchFamily="18" charset="0"/>
+                <a:cs typeface="Times New Roman" panose="02020603050405020304" pitchFamily="18" charset="0"/>
+              </a:rPr>
+              <a:t>ư</a:t>
+            </a:r>
+            <a:r>
+              <a:rPr lang="en-US" dirty="0" err="1">
+                <a:latin typeface="Times New Roman" panose="02020603050405020304" pitchFamily="18" charset="0"/>
+                <a:cs typeface="Times New Roman" panose="02020603050405020304" pitchFamily="18" charset="0"/>
+              </a:rPr>
+              <a:t>ợng</a:t>
+            </a:r>
+            <a:r>
+              <a:rPr lang="en-US" dirty="0">
+                <a:latin typeface="Times New Roman" panose="02020603050405020304" pitchFamily="18" charset="0"/>
+                <a:cs typeface="Times New Roman" panose="02020603050405020304" pitchFamily="18" charset="0"/>
+              </a:rPr>
+              <a:t> </a:t>
+            </a:r>
+            <a:r>
+              <a:rPr lang="en-US" dirty="0" err="1">
+                <a:latin typeface="Times New Roman" panose="02020603050405020304" pitchFamily="18" charset="0"/>
+                <a:cs typeface="Times New Roman" panose="02020603050405020304" pitchFamily="18" charset="0"/>
+              </a:rPr>
+              <a:t>có</a:t>
+            </a:r>
+            <a:r>
+              <a:rPr lang="en-US" dirty="0">
+                <a:latin typeface="Times New Roman" panose="02020603050405020304" pitchFamily="18" charset="0"/>
+                <a:cs typeface="Times New Roman" panose="02020603050405020304" pitchFamily="18" charset="0"/>
+              </a:rPr>
+              <a:t> </a:t>
+            </a:r>
+            <a:r>
+              <a:rPr lang="en-US" dirty="0" err="1">
+                <a:latin typeface="Times New Roman" panose="02020603050405020304" pitchFamily="18" charset="0"/>
+                <a:cs typeface="Times New Roman" panose="02020603050405020304" pitchFamily="18" charset="0"/>
+              </a:rPr>
+              <a:t>cùng</a:t>
+            </a:r>
+            <a:r>
+              <a:rPr lang="en-US" dirty="0">
+                <a:latin typeface="Times New Roman" panose="02020603050405020304" pitchFamily="18" charset="0"/>
+                <a:cs typeface="Times New Roman" panose="02020603050405020304" pitchFamily="18" charset="0"/>
+              </a:rPr>
+              <a:t> </a:t>
+            </a:r>
+            <a:r>
+              <a:rPr lang="en-US" dirty="0" err="1">
+                <a:latin typeface="Times New Roman" panose="02020603050405020304" pitchFamily="18" charset="0"/>
+                <a:cs typeface="Times New Roman" panose="02020603050405020304" pitchFamily="18" charset="0"/>
+              </a:rPr>
+              <a:t>một</a:t>
+            </a:r>
+            <a:r>
+              <a:rPr lang="en-US" dirty="0">
+                <a:latin typeface="Times New Roman" panose="02020603050405020304" pitchFamily="18" charset="0"/>
+                <a:cs typeface="Times New Roman" panose="02020603050405020304" pitchFamily="18" charset="0"/>
+              </a:rPr>
+              <a:t> </a:t>
+            </a:r>
+            <a:r>
+              <a:rPr lang="en-US" dirty="0" err="1">
+                <a:latin typeface="Times New Roman" panose="02020603050405020304" pitchFamily="18" charset="0"/>
+                <a:cs typeface="Times New Roman" panose="02020603050405020304" pitchFamily="18" charset="0"/>
+              </a:rPr>
+              <a:t>số</a:t>
+            </a:r>
+            <a:r>
+              <a:rPr lang="en-US" dirty="0">
+                <a:latin typeface="Times New Roman" panose="02020603050405020304" pitchFamily="18" charset="0"/>
+                <a:cs typeface="Times New Roman" panose="02020603050405020304" pitchFamily="18" charset="0"/>
+              </a:rPr>
+              <a:t> </a:t>
+            </a:r>
+            <a:r>
+              <a:rPr lang="en-US" dirty="0" err="1">
+                <a:latin typeface="Times New Roman" panose="02020603050405020304" pitchFamily="18" charset="0"/>
+                <a:cs typeface="Times New Roman" panose="02020603050405020304" pitchFamily="18" charset="0"/>
+              </a:rPr>
+              <a:t>hành</a:t>
+            </a:r>
+            <a:r>
+              <a:rPr lang="en-US" dirty="0">
+                <a:latin typeface="Times New Roman" panose="02020603050405020304" pitchFamily="18" charset="0"/>
+                <a:cs typeface="Times New Roman" panose="02020603050405020304" pitchFamily="18" charset="0"/>
+              </a:rPr>
+              <a:t> vi, </a:t>
+            </a:r>
+            <a:r>
+              <a:rPr lang="en-US" dirty="0" err="1">
+                <a:latin typeface="Times New Roman" panose="02020603050405020304" pitchFamily="18" charset="0"/>
+                <a:cs typeface="Times New Roman" panose="02020603050405020304" pitchFamily="18" charset="0"/>
+              </a:rPr>
+              <a:t>hoạt</a:t>
+            </a:r>
+            <a:r>
+              <a:rPr lang="en-US" dirty="0">
+                <a:latin typeface="Times New Roman" panose="02020603050405020304" pitchFamily="18" charset="0"/>
+                <a:cs typeface="Times New Roman" panose="02020603050405020304" pitchFamily="18" charset="0"/>
+              </a:rPr>
+              <a:t> </a:t>
+            </a:r>
+            <a:r>
+              <a:rPr lang="en-US" dirty="0" err="1">
+                <a:latin typeface="Times New Roman" panose="02020603050405020304" pitchFamily="18" charset="0"/>
+                <a:cs typeface="Times New Roman" panose="02020603050405020304" pitchFamily="18" charset="0"/>
+              </a:rPr>
+              <a:t>động</a:t>
+            </a:r>
+            <a:r>
+              <a:rPr lang="en-US" dirty="0">
+                <a:latin typeface="Times New Roman" panose="02020603050405020304" pitchFamily="18" charset="0"/>
+                <a:cs typeface="Times New Roman" panose="02020603050405020304" pitchFamily="18" charset="0"/>
+              </a:rPr>
+              <a:t> </a:t>
+            </a:r>
+            <a:r>
+              <a:rPr lang="en-US" dirty="0" err="1">
+                <a:latin typeface="Times New Roman" panose="02020603050405020304" pitchFamily="18" charset="0"/>
+                <a:cs typeface="Times New Roman" panose="02020603050405020304" pitchFamily="18" charset="0"/>
+              </a:rPr>
+              <a:t>giống</a:t>
+            </a:r>
+            <a:r>
+              <a:rPr lang="en-US" dirty="0">
+                <a:latin typeface="Times New Roman" panose="02020603050405020304" pitchFamily="18" charset="0"/>
+                <a:cs typeface="Times New Roman" panose="02020603050405020304" pitchFamily="18" charset="0"/>
+              </a:rPr>
+              <a:t> </a:t>
+            </a:r>
+            <a:r>
+              <a:rPr lang="en-US" dirty="0" err="1">
+                <a:latin typeface="Times New Roman" panose="02020603050405020304" pitchFamily="18" charset="0"/>
+                <a:cs typeface="Times New Roman" panose="02020603050405020304" pitchFamily="18" charset="0"/>
+              </a:rPr>
+              <a:t>nhau</a:t>
+            </a:r>
+            <a:r>
+              <a:rPr lang="en-US" dirty="0">
+                <a:latin typeface="Times New Roman" panose="02020603050405020304" pitchFamily="18" charset="0"/>
+                <a:cs typeface="Times New Roman" panose="02020603050405020304" pitchFamily="18" charset="0"/>
+              </a:rPr>
+              <a:t> </a:t>
+            </a:r>
+            <a:r>
+              <a:rPr lang="en-US" dirty="0" err="1">
+                <a:latin typeface="Times New Roman" panose="02020603050405020304" pitchFamily="18" charset="0"/>
+                <a:cs typeface="Times New Roman" panose="02020603050405020304" pitchFamily="18" charset="0"/>
+              </a:rPr>
+              <a:t>về</a:t>
+            </a:r>
+            <a:r>
+              <a:rPr lang="en-US" dirty="0">
+                <a:latin typeface="Times New Roman" panose="02020603050405020304" pitchFamily="18" charset="0"/>
+                <a:cs typeface="Times New Roman" panose="02020603050405020304" pitchFamily="18" charset="0"/>
+              </a:rPr>
+              <a:t> </a:t>
+            </a:r>
+            <a:r>
+              <a:rPr lang="en-US" dirty="0" err="1">
+                <a:latin typeface="Times New Roman" panose="02020603050405020304" pitchFamily="18" charset="0"/>
+                <a:cs typeface="Times New Roman" panose="02020603050405020304" pitchFamily="18" charset="0"/>
+              </a:rPr>
+              <a:t>khái</a:t>
+            </a:r>
+            <a:r>
+              <a:rPr lang="en-US" dirty="0">
+                <a:latin typeface="Times New Roman" panose="02020603050405020304" pitchFamily="18" charset="0"/>
+                <a:cs typeface="Times New Roman" panose="02020603050405020304" pitchFamily="18" charset="0"/>
+              </a:rPr>
+              <a:t> </a:t>
+            </a:r>
+            <a:r>
+              <a:rPr lang="en-US" dirty="0" err="1">
+                <a:latin typeface="Times New Roman" panose="02020603050405020304" pitchFamily="18" charset="0"/>
+                <a:cs typeface="Times New Roman" panose="02020603050405020304" pitchFamily="18" charset="0"/>
+              </a:rPr>
+              <a:t>niệm</a:t>
+            </a:r>
+            <a:r>
+              <a:rPr lang="en-US" dirty="0">
+                <a:latin typeface="Times New Roman" panose="02020603050405020304" pitchFamily="18" charset="0"/>
+                <a:cs typeface="Times New Roman" panose="02020603050405020304" pitchFamily="18" charset="0"/>
+              </a:rPr>
+              <a:t> </a:t>
+            </a:r>
+            <a:r>
+              <a:rPr lang="en-US" dirty="0" err="1">
+                <a:latin typeface="Times New Roman" panose="02020603050405020304" pitchFamily="18" charset="0"/>
+                <a:cs typeface="Times New Roman" panose="02020603050405020304" pitchFamily="18" charset="0"/>
+              </a:rPr>
+              <a:t>chung</a:t>
+            </a:r>
+            <a:r>
+              <a:rPr lang="en-US" dirty="0">
+                <a:latin typeface="Times New Roman" panose="02020603050405020304" pitchFamily="18" charset="0"/>
+                <a:cs typeface="Times New Roman" panose="02020603050405020304" pitchFamily="18" charset="0"/>
+              </a:rPr>
+              <a:t>. </a:t>
+            </a:r>
+            <a:r>
+              <a:rPr lang="en-US" dirty="0" err="1">
+                <a:latin typeface="Times New Roman" panose="02020603050405020304" pitchFamily="18" charset="0"/>
+                <a:cs typeface="Times New Roman" panose="02020603050405020304" pitchFamily="18" charset="0"/>
+              </a:rPr>
+              <a:t>Ví</a:t>
+            </a:r>
+            <a:r>
+              <a:rPr lang="en-US" dirty="0">
+                <a:latin typeface="Times New Roman" panose="02020603050405020304" pitchFamily="18" charset="0"/>
+                <a:cs typeface="Times New Roman" panose="02020603050405020304" pitchFamily="18" charset="0"/>
+              </a:rPr>
+              <a:t> </a:t>
+            </a:r>
+            <a:r>
+              <a:rPr lang="en-US" dirty="0" err="1">
+                <a:latin typeface="Times New Roman" panose="02020603050405020304" pitchFamily="18" charset="0"/>
+                <a:cs typeface="Times New Roman" panose="02020603050405020304" pitchFamily="18" charset="0"/>
+              </a:rPr>
+              <a:t>dụ</a:t>
+            </a:r>
+            <a:r>
+              <a:rPr lang="en-US" dirty="0">
+                <a:latin typeface="Times New Roman" panose="02020603050405020304" pitchFamily="18" charset="0"/>
+                <a:cs typeface="Times New Roman" panose="02020603050405020304" pitchFamily="18" charset="0"/>
+              </a:rPr>
+              <a:t>: </a:t>
+            </a:r>
+            <a:r>
+              <a:rPr lang="en-US" dirty="0" err="1">
+                <a:latin typeface="Times New Roman" panose="02020603050405020304" pitchFamily="18" charset="0"/>
+                <a:cs typeface="Times New Roman" panose="02020603050405020304" pitchFamily="18" charset="0"/>
+              </a:rPr>
+              <a:t>Động</a:t>
+            </a:r>
+            <a:r>
+              <a:rPr lang="en-US" dirty="0">
+                <a:latin typeface="Times New Roman" panose="02020603050405020304" pitchFamily="18" charset="0"/>
+                <a:cs typeface="Times New Roman" panose="02020603050405020304" pitchFamily="18" charset="0"/>
+              </a:rPr>
+              <a:t> </a:t>
+            </a:r>
+            <a:r>
+              <a:rPr lang="en-US" dirty="0" err="1">
+                <a:latin typeface="Times New Roman" panose="02020603050405020304" pitchFamily="18" charset="0"/>
+                <a:cs typeface="Times New Roman" panose="02020603050405020304" pitchFamily="18" charset="0"/>
+              </a:rPr>
+              <a:t>vật</a:t>
+            </a:r>
+            <a:r>
+              <a:rPr lang="en-US" dirty="0">
+                <a:latin typeface="Times New Roman" panose="02020603050405020304" pitchFamily="18" charset="0"/>
+                <a:cs typeface="Times New Roman" panose="02020603050405020304" pitchFamily="18" charset="0"/>
+              </a:rPr>
+              <a:t> (</a:t>
+            </a:r>
+            <a:r>
+              <a:rPr lang="en-US" dirty="0" err="1">
+                <a:latin typeface="Times New Roman" panose="02020603050405020304" pitchFamily="18" charset="0"/>
+                <a:cs typeface="Times New Roman" panose="02020603050405020304" pitchFamily="18" charset="0"/>
+              </a:rPr>
+              <a:t>Chó</a:t>
+            </a:r>
+            <a:r>
+              <a:rPr lang="en-US" dirty="0">
+                <a:latin typeface="Times New Roman" panose="02020603050405020304" pitchFamily="18" charset="0"/>
+                <a:cs typeface="Times New Roman" panose="02020603050405020304" pitchFamily="18" charset="0"/>
+              </a:rPr>
+              <a:t>, </a:t>
+            </a:r>
+            <a:r>
+              <a:rPr lang="en-US" dirty="0" err="1">
+                <a:latin typeface="Times New Roman" panose="02020603050405020304" pitchFamily="18" charset="0"/>
+                <a:cs typeface="Times New Roman" panose="02020603050405020304" pitchFamily="18" charset="0"/>
+              </a:rPr>
+              <a:t>mèo</a:t>
+            </a:r>
+            <a:r>
+              <a:rPr lang="en-US" dirty="0">
+                <a:latin typeface="Times New Roman" panose="02020603050405020304" pitchFamily="18" charset="0"/>
+                <a:cs typeface="Times New Roman" panose="02020603050405020304" pitchFamily="18" charset="0"/>
+              </a:rPr>
+              <a:t>, </a:t>
+            </a:r>
+            <a:r>
+              <a:rPr lang="en-US" dirty="0" err="1">
+                <a:latin typeface="Times New Roman" panose="02020603050405020304" pitchFamily="18" charset="0"/>
+                <a:cs typeface="Times New Roman" panose="02020603050405020304" pitchFamily="18" charset="0"/>
+              </a:rPr>
+              <a:t>chim</a:t>
+            </a:r>
+            <a:r>
+              <a:rPr lang="en-US" dirty="0">
+                <a:latin typeface="Times New Roman" panose="02020603050405020304" pitchFamily="18" charset="0"/>
+                <a:cs typeface="Times New Roman" panose="02020603050405020304" pitchFamily="18" charset="0"/>
+              </a:rPr>
+              <a:t>…) </a:t>
+            </a:r>
+            <a:r>
+              <a:rPr lang="en-US" dirty="0" err="1">
+                <a:latin typeface="Times New Roman" panose="02020603050405020304" pitchFamily="18" charset="0"/>
+                <a:cs typeface="Times New Roman" panose="02020603050405020304" pitchFamily="18" charset="0"/>
+              </a:rPr>
+              <a:t>có</a:t>
+            </a:r>
+            <a:r>
+              <a:rPr lang="en-US" dirty="0">
+                <a:latin typeface="Times New Roman" panose="02020603050405020304" pitchFamily="18" charset="0"/>
+                <a:cs typeface="Times New Roman" panose="02020603050405020304" pitchFamily="18" charset="0"/>
+              </a:rPr>
+              <a:t> </a:t>
+            </a:r>
+            <a:r>
+              <a:rPr lang="en-US" dirty="0" err="1">
+                <a:latin typeface="Times New Roman" panose="02020603050405020304" pitchFamily="18" charset="0"/>
+                <a:cs typeface="Times New Roman" panose="02020603050405020304" pitchFamily="18" charset="0"/>
+              </a:rPr>
+              <a:t>các</a:t>
+            </a:r>
+            <a:r>
+              <a:rPr lang="en-US" dirty="0">
+                <a:latin typeface="Times New Roman" panose="02020603050405020304" pitchFamily="18" charset="0"/>
+                <a:cs typeface="Times New Roman" panose="02020603050405020304" pitchFamily="18" charset="0"/>
+              </a:rPr>
+              <a:t> </a:t>
+            </a:r>
+            <a:r>
+              <a:rPr lang="en-US" dirty="0" err="1">
+                <a:latin typeface="Times New Roman" panose="02020603050405020304" pitchFamily="18" charset="0"/>
+                <a:cs typeface="Times New Roman" panose="02020603050405020304" pitchFamily="18" charset="0"/>
+              </a:rPr>
+              <a:t>hành</a:t>
+            </a:r>
+            <a:r>
+              <a:rPr lang="en-US" dirty="0">
+                <a:latin typeface="Times New Roman" panose="02020603050405020304" pitchFamily="18" charset="0"/>
+                <a:cs typeface="Times New Roman" panose="02020603050405020304" pitchFamily="18" charset="0"/>
+              </a:rPr>
+              <a:t> vi “</a:t>
+            </a:r>
+            <a:r>
+              <a:rPr lang="en-US" dirty="0" err="1">
+                <a:latin typeface="Times New Roman" panose="02020603050405020304" pitchFamily="18" charset="0"/>
+                <a:cs typeface="Times New Roman" panose="02020603050405020304" pitchFamily="18" charset="0"/>
+              </a:rPr>
+              <a:t>Kêu</a:t>
+            </a:r>
+            <a:r>
+              <a:rPr lang="en-US" dirty="0">
+                <a:latin typeface="Times New Roman" panose="02020603050405020304" pitchFamily="18" charset="0"/>
+                <a:cs typeface="Times New Roman" panose="02020603050405020304" pitchFamily="18" charset="0"/>
+              </a:rPr>
+              <a:t>”, </a:t>
+            </a:r>
+            <a:r>
+              <a:rPr lang="en-US" dirty="0" err="1">
+                <a:latin typeface="Times New Roman" panose="02020603050405020304" pitchFamily="18" charset="0"/>
+                <a:cs typeface="Times New Roman" panose="02020603050405020304" pitchFamily="18" charset="0"/>
+              </a:rPr>
+              <a:t>hoạt</a:t>
+            </a:r>
+            <a:r>
+              <a:rPr lang="en-US" dirty="0">
+                <a:latin typeface="Times New Roman" panose="02020603050405020304" pitchFamily="18" charset="0"/>
+                <a:cs typeface="Times New Roman" panose="02020603050405020304" pitchFamily="18" charset="0"/>
+              </a:rPr>
+              <a:t> </a:t>
+            </a:r>
+            <a:r>
+              <a:rPr lang="en-US" dirty="0" err="1">
+                <a:latin typeface="Times New Roman" panose="02020603050405020304" pitchFamily="18" charset="0"/>
+                <a:cs typeface="Times New Roman" panose="02020603050405020304" pitchFamily="18" charset="0"/>
+              </a:rPr>
+              <a:t>động</a:t>
+            </a:r>
+            <a:r>
+              <a:rPr lang="en-US" dirty="0">
+                <a:latin typeface="Times New Roman" panose="02020603050405020304" pitchFamily="18" charset="0"/>
+                <a:cs typeface="Times New Roman" panose="02020603050405020304" pitchFamily="18" charset="0"/>
+              </a:rPr>
+              <a:t> “</a:t>
+            </a:r>
+            <a:r>
+              <a:rPr lang="en-US" dirty="0" err="1">
+                <a:latin typeface="Times New Roman" panose="02020603050405020304" pitchFamily="18" charset="0"/>
+                <a:cs typeface="Times New Roman" panose="02020603050405020304" pitchFamily="18" charset="0"/>
+              </a:rPr>
+              <a:t>Đếm</a:t>
+            </a:r>
+            <a:r>
+              <a:rPr lang="en-US" dirty="0">
+                <a:latin typeface="Times New Roman" panose="02020603050405020304" pitchFamily="18" charset="0"/>
+                <a:cs typeface="Times New Roman" panose="02020603050405020304" pitchFamily="18" charset="0"/>
+              </a:rPr>
+              <a:t> </a:t>
+            </a:r>
+            <a:r>
+              <a:rPr lang="en-US" dirty="0" err="1">
+                <a:latin typeface="Times New Roman" panose="02020603050405020304" pitchFamily="18" charset="0"/>
+                <a:cs typeface="Times New Roman" panose="02020603050405020304" pitchFamily="18" charset="0"/>
+              </a:rPr>
+              <a:t>số</a:t>
+            </a:r>
+            <a:r>
+              <a:rPr lang="en-US" dirty="0">
+                <a:latin typeface="Times New Roman" panose="02020603050405020304" pitchFamily="18" charset="0"/>
+                <a:cs typeface="Times New Roman" panose="02020603050405020304" pitchFamily="18" charset="0"/>
+              </a:rPr>
+              <a:t> </a:t>
+            </a:r>
+            <a:r>
+              <a:rPr lang="en-US" dirty="0" err="1">
+                <a:latin typeface="Times New Roman" panose="02020603050405020304" pitchFamily="18" charset="0"/>
+                <a:cs typeface="Times New Roman" panose="02020603050405020304" pitchFamily="18" charset="0"/>
+              </a:rPr>
+              <a:t>chân</a:t>
+            </a:r>
+            <a:r>
+              <a:rPr lang="en-US" dirty="0">
+                <a:latin typeface="Times New Roman" panose="02020603050405020304" pitchFamily="18" charset="0"/>
+                <a:cs typeface="Times New Roman" panose="02020603050405020304" pitchFamily="18" charset="0"/>
+              </a:rPr>
+              <a:t>” </a:t>
+            </a:r>
+            <a:r>
+              <a:rPr lang="en-US" dirty="0" err="1">
+                <a:latin typeface="Times New Roman" panose="02020603050405020304" pitchFamily="18" charset="0"/>
+                <a:cs typeface="Times New Roman" panose="02020603050405020304" pitchFamily="18" charset="0"/>
+              </a:rPr>
+              <a:t>giống</a:t>
+            </a:r>
+            <a:r>
+              <a:rPr lang="en-US" dirty="0">
+                <a:latin typeface="Times New Roman" panose="02020603050405020304" pitchFamily="18" charset="0"/>
+                <a:cs typeface="Times New Roman" panose="02020603050405020304" pitchFamily="18" charset="0"/>
+              </a:rPr>
+              <a:t> </a:t>
+            </a:r>
+            <a:r>
+              <a:rPr lang="en-US" dirty="0" err="1">
+                <a:latin typeface="Times New Roman" panose="02020603050405020304" pitchFamily="18" charset="0"/>
+                <a:cs typeface="Times New Roman" panose="02020603050405020304" pitchFamily="18" charset="0"/>
+              </a:rPr>
+              <a:t>nhau</a:t>
+            </a:r>
+            <a:r>
+              <a:rPr lang="en-US" dirty="0">
+                <a:latin typeface="Times New Roman" panose="02020603050405020304" pitchFamily="18" charset="0"/>
+                <a:cs typeface="Times New Roman" panose="02020603050405020304" pitchFamily="18" charset="0"/>
+              </a:rPr>
+              <a:t>, </a:t>
+            </a:r>
+            <a:r>
+              <a:rPr lang="en-US" dirty="0" err="1">
+                <a:latin typeface="Times New Roman" panose="02020603050405020304" pitchFamily="18" charset="0"/>
+                <a:cs typeface="Times New Roman" panose="02020603050405020304" pitchFamily="18" charset="0"/>
+              </a:rPr>
+              <a:t>nh</a:t>
+            </a:r>
+            <a:r>
+              <a:rPr lang="vi-VN" dirty="0">
+                <a:latin typeface="Times New Roman" panose="02020603050405020304" pitchFamily="18" charset="0"/>
+                <a:cs typeface="Times New Roman" panose="02020603050405020304" pitchFamily="18" charset="0"/>
+              </a:rPr>
+              <a:t>ư</a:t>
+            </a:r>
+            <a:r>
+              <a:rPr lang="en-US" dirty="0">
+                <a:latin typeface="Times New Roman" panose="02020603050405020304" pitchFamily="18" charset="0"/>
+                <a:cs typeface="Times New Roman" panose="02020603050405020304" pitchFamily="18" charset="0"/>
+              </a:rPr>
+              <a:t>ng </a:t>
+            </a:r>
+            <a:r>
+              <a:rPr lang="en-US" dirty="0" err="1">
+                <a:latin typeface="Times New Roman" panose="02020603050405020304" pitchFamily="18" charset="0"/>
+                <a:cs typeface="Times New Roman" panose="02020603050405020304" pitchFamily="18" charset="0"/>
+              </a:rPr>
+              <a:t>cụ</a:t>
+            </a:r>
+            <a:r>
+              <a:rPr lang="en-US" dirty="0">
+                <a:latin typeface="Times New Roman" panose="02020603050405020304" pitchFamily="18" charset="0"/>
+                <a:cs typeface="Times New Roman" panose="02020603050405020304" pitchFamily="18" charset="0"/>
+              </a:rPr>
+              <a:t> </a:t>
+            </a:r>
+            <a:r>
+              <a:rPr lang="en-US" dirty="0" err="1">
+                <a:latin typeface="Times New Roman" panose="02020603050405020304" pitchFamily="18" charset="0"/>
+                <a:cs typeface="Times New Roman" panose="02020603050405020304" pitchFamily="18" charset="0"/>
+              </a:rPr>
+              <a:t>thể</a:t>
+            </a:r>
+            <a:r>
+              <a:rPr lang="en-US" dirty="0">
+                <a:latin typeface="Times New Roman" panose="02020603050405020304" pitchFamily="18" charset="0"/>
+                <a:cs typeface="Times New Roman" panose="02020603050405020304" pitchFamily="18" charset="0"/>
+              </a:rPr>
+              <a:t> </a:t>
+            </a:r>
+            <a:r>
+              <a:rPr lang="en-US" dirty="0" err="1">
+                <a:latin typeface="Times New Roman" panose="02020603050405020304" pitchFamily="18" charset="0"/>
+                <a:cs typeface="Times New Roman" panose="02020603050405020304" pitchFamily="18" charset="0"/>
+              </a:rPr>
+              <a:t>sẽ</a:t>
+            </a:r>
+            <a:r>
+              <a:rPr lang="en-US" dirty="0">
+                <a:latin typeface="Times New Roman" panose="02020603050405020304" pitchFamily="18" charset="0"/>
+                <a:cs typeface="Times New Roman" panose="02020603050405020304" pitchFamily="18" charset="0"/>
+              </a:rPr>
+              <a:t> </a:t>
+            </a:r>
+            <a:r>
+              <a:rPr lang="en-US" dirty="0" err="1">
+                <a:latin typeface="Times New Roman" panose="02020603050405020304" pitchFamily="18" charset="0"/>
+                <a:cs typeface="Times New Roman" panose="02020603050405020304" pitchFamily="18" charset="0"/>
+              </a:rPr>
+              <a:t>khác</a:t>
+            </a:r>
+            <a:r>
+              <a:rPr lang="en-US" dirty="0">
+                <a:latin typeface="Times New Roman" panose="02020603050405020304" pitchFamily="18" charset="0"/>
+                <a:cs typeface="Times New Roman" panose="02020603050405020304" pitchFamily="18" charset="0"/>
+              </a:rPr>
+              <a:t> </a:t>
+            </a:r>
+            <a:r>
+              <a:rPr lang="en-US" dirty="0" err="1">
+                <a:latin typeface="Times New Roman" panose="02020603050405020304" pitchFamily="18" charset="0"/>
+                <a:cs typeface="Times New Roman" panose="02020603050405020304" pitchFamily="18" charset="0"/>
+              </a:rPr>
+              <a:t>nhau</a:t>
+            </a:r>
+            <a:r>
+              <a:rPr lang="en-US" dirty="0">
+                <a:latin typeface="Times New Roman" panose="02020603050405020304" pitchFamily="18" charset="0"/>
+                <a:cs typeface="Times New Roman" panose="02020603050405020304" pitchFamily="18" charset="0"/>
+              </a:rPr>
+              <a:t>( </a:t>
+            </a:r>
+            <a:r>
+              <a:rPr lang="en-US" dirty="0" err="1">
+                <a:latin typeface="Times New Roman" panose="02020603050405020304" pitchFamily="18" charset="0"/>
+                <a:cs typeface="Times New Roman" panose="02020603050405020304" pitchFamily="18" charset="0"/>
+              </a:rPr>
+              <a:t>Chó</a:t>
+            </a:r>
+            <a:r>
+              <a:rPr lang="en-US" dirty="0">
+                <a:latin typeface="Times New Roman" panose="02020603050405020304" pitchFamily="18" charset="0"/>
+                <a:cs typeface="Times New Roman" panose="02020603050405020304" pitchFamily="18" charset="0"/>
+              </a:rPr>
+              <a:t>: </a:t>
+            </a:r>
+            <a:r>
+              <a:rPr lang="en-US" dirty="0" err="1">
+                <a:latin typeface="Times New Roman" panose="02020603050405020304" pitchFamily="18" charset="0"/>
+                <a:cs typeface="Times New Roman" panose="02020603050405020304" pitchFamily="18" charset="0"/>
+              </a:rPr>
+              <a:t>gâu</a:t>
+            </a:r>
+            <a:r>
+              <a:rPr lang="en-US" dirty="0">
+                <a:latin typeface="Times New Roman" panose="02020603050405020304" pitchFamily="18" charset="0"/>
+                <a:cs typeface="Times New Roman" panose="02020603050405020304" pitchFamily="18" charset="0"/>
+              </a:rPr>
+              <a:t> </a:t>
+            </a:r>
+            <a:r>
+              <a:rPr lang="en-US" dirty="0" err="1">
+                <a:latin typeface="Times New Roman" panose="02020603050405020304" pitchFamily="18" charset="0"/>
+                <a:cs typeface="Times New Roman" panose="02020603050405020304" pitchFamily="18" charset="0"/>
+              </a:rPr>
+              <a:t>gâu</a:t>
+            </a:r>
+            <a:r>
+              <a:rPr lang="en-US" dirty="0">
+                <a:latin typeface="Times New Roman" panose="02020603050405020304" pitchFamily="18" charset="0"/>
+                <a:cs typeface="Times New Roman" panose="02020603050405020304" pitchFamily="18" charset="0"/>
+              </a:rPr>
+              <a:t>, </a:t>
+            </a:r>
+            <a:r>
+              <a:rPr lang="en-US" dirty="0" err="1">
+                <a:latin typeface="Times New Roman" panose="02020603050405020304" pitchFamily="18" charset="0"/>
+                <a:cs typeface="Times New Roman" panose="02020603050405020304" pitchFamily="18" charset="0"/>
+              </a:rPr>
+              <a:t>mèo</a:t>
+            </a:r>
+            <a:r>
+              <a:rPr lang="en-US" dirty="0">
+                <a:latin typeface="Times New Roman" panose="02020603050405020304" pitchFamily="18" charset="0"/>
+                <a:cs typeface="Times New Roman" panose="02020603050405020304" pitchFamily="18" charset="0"/>
+              </a:rPr>
+              <a:t>: </a:t>
+            </a:r>
+            <a:r>
+              <a:rPr lang="en-US" dirty="0" err="1">
+                <a:latin typeface="Times New Roman" panose="02020603050405020304" pitchFamily="18" charset="0"/>
+                <a:cs typeface="Times New Roman" panose="02020603050405020304" pitchFamily="18" charset="0"/>
+              </a:rPr>
+              <a:t>meo</a:t>
+            </a:r>
+            <a:r>
+              <a:rPr lang="en-US" dirty="0">
+                <a:latin typeface="Times New Roman" panose="02020603050405020304" pitchFamily="18" charset="0"/>
+                <a:cs typeface="Times New Roman" panose="02020603050405020304" pitchFamily="18" charset="0"/>
+              </a:rPr>
+              <a:t> </a:t>
+            </a:r>
+            <a:r>
+              <a:rPr lang="en-US" dirty="0" err="1">
+                <a:latin typeface="Times New Roman" panose="02020603050405020304" pitchFamily="18" charset="0"/>
+                <a:cs typeface="Times New Roman" panose="02020603050405020304" pitchFamily="18" charset="0"/>
+              </a:rPr>
+              <a:t>meo</a:t>
+            </a:r>
+            <a:r>
+              <a:rPr lang="en-US" dirty="0">
+                <a:latin typeface="Times New Roman" panose="02020603050405020304" pitchFamily="18" charset="0"/>
+                <a:cs typeface="Times New Roman" panose="02020603050405020304" pitchFamily="18" charset="0"/>
+              </a:rPr>
+              <a:t>, </a:t>
+            </a:r>
+            <a:r>
+              <a:rPr lang="en-US" dirty="0" err="1">
+                <a:latin typeface="Times New Roman" panose="02020603050405020304" pitchFamily="18" charset="0"/>
+                <a:cs typeface="Times New Roman" panose="02020603050405020304" pitchFamily="18" charset="0"/>
+              </a:rPr>
+              <a:t>chim</a:t>
+            </a:r>
+            <a:r>
+              <a:rPr lang="en-US" dirty="0">
+                <a:latin typeface="Times New Roman" panose="02020603050405020304" pitchFamily="18" charset="0"/>
+                <a:cs typeface="Times New Roman" panose="02020603050405020304" pitchFamily="18" charset="0"/>
+              </a:rPr>
+              <a:t>: </a:t>
+            </a:r>
+            <a:r>
+              <a:rPr lang="en-US" dirty="0" err="1">
+                <a:latin typeface="Times New Roman" panose="02020603050405020304" pitchFamily="18" charset="0"/>
+                <a:cs typeface="Times New Roman" panose="02020603050405020304" pitchFamily="18" charset="0"/>
+              </a:rPr>
+              <a:t>chiếp</a:t>
+            </a:r>
+            <a:r>
+              <a:rPr lang="en-US" dirty="0">
+                <a:latin typeface="Times New Roman" panose="02020603050405020304" pitchFamily="18" charset="0"/>
+                <a:cs typeface="Times New Roman" panose="02020603050405020304" pitchFamily="18" charset="0"/>
+              </a:rPr>
+              <a:t> </a:t>
+            </a:r>
+            <a:r>
+              <a:rPr lang="en-US" dirty="0" err="1">
+                <a:latin typeface="Times New Roman" panose="02020603050405020304" pitchFamily="18" charset="0"/>
+                <a:cs typeface="Times New Roman" panose="02020603050405020304" pitchFamily="18" charset="0"/>
+              </a:rPr>
+              <a:t>chiếp</a:t>
+            </a:r>
+            <a:r>
+              <a:rPr lang="en-US" dirty="0">
+                <a:latin typeface="Times New Roman" panose="02020603050405020304" pitchFamily="18" charset="0"/>
+                <a:cs typeface="Times New Roman" panose="02020603050405020304" pitchFamily="18" charset="0"/>
+              </a:rPr>
+              <a:t>), (</a:t>
+            </a:r>
+            <a:r>
+              <a:rPr lang="en-US" dirty="0" err="1">
+                <a:latin typeface="Times New Roman" panose="02020603050405020304" pitchFamily="18" charset="0"/>
+                <a:cs typeface="Times New Roman" panose="02020603050405020304" pitchFamily="18" charset="0"/>
+              </a:rPr>
+              <a:t>Chó</a:t>
+            </a:r>
+            <a:r>
+              <a:rPr lang="en-US" dirty="0">
+                <a:latin typeface="Times New Roman" panose="02020603050405020304" pitchFamily="18" charset="0"/>
+                <a:cs typeface="Times New Roman" panose="02020603050405020304" pitchFamily="18" charset="0"/>
+              </a:rPr>
+              <a:t>, </a:t>
+            </a:r>
+            <a:r>
+              <a:rPr lang="en-US" dirty="0" err="1">
+                <a:latin typeface="Times New Roman" panose="02020603050405020304" pitchFamily="18" charset="0"/>
+                <a:cs typeface="Times New Roman" panose="02020603050405020304" pitchFamily="18" charset="0"/>
+              </a:rPr>
+              <a:t>mèo</a:t>
+            </a:r>
+            <a:r>
+              <a:rPr lang="en-US" dirty="0">
+                <a:latin typeface="Times New Roman" panose="02020603050405020304" pitchFamily="18" charset="0"/>
+                <a:cs typeface="Times New Roman" panose="02020603050405020304" pitchFamily="18" charset="0"/>
+              </a:rPr>
+              <a:t>: 4 </a:t>
+            </a:r>
+            <a:r>
+              <a:rPr lang="en-US" dirty="0" err="1">
+                <a:latin typeface="Times New Roman" panose="02020603050405020304" pitchFamily="18" charset="0"/>
+                <a:cs typeface="Times New Roman" panose="02020603050405020304" pitchFamily="18" charset="0"/>
+              </a:rPr>
+              <a:t>chân</a:t>
+            </a:r>
+            <a:r>
+              <a:rPr lang="en-US" dirty="0">
+                <a:latin typeface="Times New Roman" panose="02020603050405020304" pitchFamily="18" charset="0"/>
+                <a:cs typeface="Times New Roman" panose="02020603050405020304" pitchFamily="18" charset="0"/>
+              </a:rPr>
+              <a:t>, </a:t>
+            </a:r>
+            <a:r>
+              <a:rPr lang="en-US" dirty="0" err="1">
+                <a:latin typeface="Times New Roman" panose="02020603050405020304" pitchFamily="18" charset="0"/>
+                <a:cs typeface="Times New Roman" panose="02020603050405020304" pitchFamily="18" charset="0"/>
+              </a:rPr>
+              <a:t>chim</a:t>
+            </a:r>
+            <a:r>
+              <a:rPr lang="en-US" dirty="0">
+                <a:latin typeface="Times New Roman" panose="02020603050405020304" pitchFamily="18" charset="0"/>
+                <a:cs typeface="Times New Roman" panose="02020603050405020304" pitchFamily="18" charset="0"/>
+              </a:rPr>
+              <a:t>: 2 </a:t>
+            </a:r>
+            <a:r>
+              <a:rPr lang="en-US" dirty="0" err="1">
+                <a:latin typeface="Times New Roman" panose="02020603050405020304" pitchFamily="18" charset="0"/>
+                <a:cs typeface="Times New Roman" panose="02020603050405020304" pitchFamily="18" charset="0"/>
+              </a:rPr>
+              <a:t>chân</a:t>
+            </a:r>
+            <a:r>
+              <a:rPr lang="en-US" dirty="0">
+                <a:latin typeface="Times New Roman" panose="02020603050405020304" pitchFamily="18" charset="0"/>
+                <a:cs typeface="Times New Roman" panose="02020603050405020304" pitchFamily="18" charset="0"/>
+              </a:rPr>
+              <a:t>)… </a:t>
+            </a:r>
+            <a:r>
+              <a:rPr lang="en-US" dirty="0" err="1">
+                <a:latin typeface="Times New Roman" panose="02020603050405020304" pitchFamily="18" charset="0"/>
+                <a:cs typeface="Times New Roman" panose="02020603050405020304" pitchFamily="18" charset="0"/>
+              </a:rPr>
+              <a:t>hoặc</a:t>
+            </a:r>
+            <a:r>
+              <a:rPr lang="en-US" dirty="0">
+                <a:latin typeface="Times New Roman" panose="02020603050405020304" pitchFamily="18" charset="0"/>
+                <a:cs typeface="Times New Roman" panose="02020603050405020304" pitchFamily="18" charset="0"/>
+              </a:rPr>
+              <a:t> </a:t>
+            </a:r>
+            <a:r>
+              <a:rPr lang="en-US" dirty="0" err="1">
+                <a:latin typeface="Times New Roman" panose="02020603050405020304" pitchFamily="18" charset="0"/>
+                <a:cs typeface="Times New Roman" panose="02020603050405020304" pitchFamily="18" charset="0"/>
+              </a:rPr>
+              <a:t>Hình</a:t>
+            </a:r>
+            <a:r>
+              <a:rPr lang="en-US" dirty="0">
+                <a:latin typeface="Times New Roman" panose="02020603050405020304" pitchFamily="18" charset="0"/>
+                <a:cs typeface="Times New Roman" panose="02020603050405020304" pitchFamily="18" charset="0"/>
+              </a:rPr>
+              <a:t> </a:t>
+            </a:r>
+            <a:r>
+              <a:rPr lang="en-US" dirty="0" err="1">
+                <a:latin typeface="Times New Roman" panose="02020603050405020304" pitchFamily="18" charset="0"/>
+                <a:cs typeface="Times New Roman" panose="02020603050405020304" pitchFamily="18" charset="0"/>
+              </a:rPr>
+              <a:t>phẳng</a:t>
+            </a:r>
+            <a:r>
+              <a:rPr lang="en-US" dirty="0">
+                <a:latin typeface="Times New Roman" panose="02020603050405020304" pitchFamily="18" charset="0"/>
+                <a:cs typeface="Times New Roman" panose="02020603050405020304" pitchFamily="18" charset="0"/>
+              </a:rPr>
+              <a:t> (</a:t>
+            </a:r>
+            <a:r>
+              <a:rPr lang="en-US" dirty="0" err="1">
+                <a:latin typeface="Times New Roman" panose="02020603050405020304" pitchFamily="18" charset="0"/>
+                <a:cs typeface="Times New Roman" panose="02020603050405020304" pitchFamily="18" charset="0"/>
+              </a:rPr>
+              <a:t>Tròn</a:t>
+            </a:r>
+            <a:r>
+              <a:rPr lang="en-US" dirty="0">
+                <a:latin typeface="Times New Roman" panose="02020603050405020304" pitchFamily="18" charset="0"/>
+                <a:cs typeface="Times New Roman" panose="02020603050405020304" pitchFamily="18" charset="0"/>
+              </a:rPr>
+              <a:t>, </a:t>
+            </a:r>
+            <a:r>
+              <a:rPr lang="en-US" dirty="0" err="1">
+                <a:latin typeface="Times New Roman" panose="02020603050405020304" pitchFamily="18" charset="0"/>
+                <a:cs typeface="Times New Roman" panose="02020603050405020304" pitchFamily="18" charset="0"/>
+              </a:rPr>
+              <a:t>vuông</a:t>
+            </a:r>
+            <a:r>
+              <a:rPr lang="en-US" dirty="0">
+                <a:latin typeface="Times New Roman" panose="02020603050405020304" pitchFamily="18" charset="0"/>
+                <a:cs typeface="Times New Roman" panose="02020603050405020304" pitchFamily="18" charset="0"/>
+              </a:rPr>
+              <a:t>, tam </a:t>
+            </a:r>
+            <a:r>
+              <a:rPr lang="en-US" dirty="0" err="1">
+                <a:latin typeface="Times New Roman" panose="02020603050405020304" pitchFamily="18" charset="0"/>
+                <a:cs typeface="Times New Roman" panose="02020603050405020304" pitchFamily="18" charset="0"/>
+              </a:rPr>
+              <a:t>giác</a:t>
+            </a:r>
+            <a:r>
+              <a:rPr lang="en-US" dirty="0">
+                <a:latin typeface="Times New Roman" panose="02020603050405020304" pitchFamily="18" charset="0"/>
+                <a:cs typeface="Times New Roman" panose="02020603050405020304" pitchFamily="18" charset="0"/>
+              </a:rPr>
+              <a:t>…) </a:t>
+            </a:r>
+            <a:r>
+              <a:rPr lang="en-US" dirty="0" err="1">
+                <a:latin typeface="Times New Roman" panose="02020603050405020304" pitchFamily="18" charset="0"/>
+                <a:cs typeface="Times New Roman" panose="02020603050405020304" pitchFamily="18" charset="0"/>
+              </a:rPr>
+              <a:t>có</a:t>
+            </a:r>
+            <a:r>
+              <a:rPr lang="en-US" dirty="0">
+                <a:latin typeface="Times New Roman" panose="02020603050405020304" pitchFamily="18" charset="0"/>
+                <a:cs typeface="Times New Roman" panose="02020603050405020304" pitchFamily="18" charset="0"/>
+              </a:rPr>
+              <a:t> </a:t>
+            </a:r>
+            <a:r>
+              <a:rPr lang="en-US" dirty="0" err="1">
+                <a:latin typeface="Times New Roman" panose="02020603050405020304" pitchFamily="18" charset="0"/>
+                <a:cs typeface="Times New Roman" panose="02020603050405020304" pitchFamily="18" charset="0"/>
+              </a:rPr>
+              <a:t>các</a:t>
+            </a:r>
+            <a:r>
+              <a:rPr lang="en-US" dirty="0">
+                <a:latin typeface="Times New Roman" panose="02020603050405020304" pitchFamily="18" charset="0"/>
+                <a:cs typeface="Times New Roman" panose="02020603050405020304" pitchFamily="18" charset="0"/>
+              </a:rPr>
+              <a:t> </a:t>
+            </a:r>
+            <a:r>
+              <a:rPr lang="en-US" dirty="0" err="1">
+                <a:latin typeface="Times New Roman" panose="02020603050405020304" pitchFamily="18" charset="0"/>
+                <a:cs typeface="Times New Roman" panose="02020603050405020304" pitchFamily="18" charset="0"/>
+              </a:rPr>
+              <a:t>hoạt</a:t>
+            </a:r>
+            <a:r>
+              <a:rPr lang="en-US" dirty="0">
+                <a:latin typeface="Times New Roman" panose="02020603050405020304" pitchFamily="18" charset="0"/>
+                <a:cs typeface="Times New Roman" panose="02020603050405020304" pitchFamily="18" charset="0"/>
+              </a:rPr>
+              <a:t> </a:t>
+            </a:r>
+            <a:r>
+              <a:rPr lang="en-US" dirty="0" err="1">
+                <a:latin typeface="Times New Roman" panose="02020603050405020304" pitchFamily="18" charset="0"/>
+                <a:cs typeface="Times New Roman" panose="02020603050405020304" pitchFamily="18" charset="0"/>
+              </a:rPr>
+              <a:t>động</a:t>
+            </a:r>
+            <a:r>
+              <a:rPr lang="en-US" dirty="0">
+                <a:latin typeface="Times New Roman" panose="02020603050405020304" pitchFamily="18" charset="0"/>
+                <a:cs typeface="Times New Roman" panose="02020603050405020304" pitchFamily="18" charset="0"/>
+              </a:rPr>
+              <a:t> </a:t>
+            </a:r>
+            <a:r>
+              <a:rPr lang="en-US" dirty="0" err="1">
+                <a:latin typeface="Times New Roman" panose="02020603050405020304" pitchFamily="18" charset="0"/>
+                <a:cs typeface="Times New Roman" panose="02020603050405020304" pitchFamily="18" charset="0"/>
+              </a:rPr>
+              <a:t>chung</a:t>
+            </a:r>
+            <a:r>
+              <a:rPr lang="en-US" dirty="0">
+                <a:latin typeface="Times New Roman" panose="02020603050405020304" pitchFamily="18" charset="0"/>
+                <a:cs typeface="Times New Roman" panose="02020603050405020304" pitchFamily="18" charset="0"/>
+              </a:rPr>
+              <a:t> </a:t>
+            </a:r>
+            <a:r>
+              <a:rPr lang="en-US" dirty="0" err="1">
+                <a:latin typeface="Times New Roman" panose="02020603050405020304" pitchFamily="18" charset="0"/>
+                <a:cs typeface="Times New Roman" panose="02020603050405020304" pitchFamily="18" charset="0"/>
+              </a:rPr>
+              <a:t>giống</a:t>
+            </a:r>
+            <a:r>
+              <a:rPr lang="en-US" dirty="0">
+                <a:latin typeface="Times New Roman" panose="02020603050405020304" pitchFamily="18" charset="0"/>
+                <a:cs typeface="Times New Roman" panose="02020603050405020304" pitchFamily="18" charset="0"/>
+              </a:rPr>
+              <a:t> </a:t>
+            </a:r>
+            <a:r>
+              <a:rPr lang="en-US" dirty="0" err="1">
+                <a:latin typeface="Times New Roman" panose="02020603050405020304" pitchFamily="18" charset="0"/>
+                <a:cs typeface="Times New Roman" panose="02020603050405020304" pitchFamily="18" charset="0"/>
+              </a:rPr>
+              <a:t>nhau</a:t>
+            </a:r>
+            <a:r>
+              <a:rPr lang="en-US" dirty="0">
+                <a:latin typeface="Times New Roman" panose="02020603050405020304" pitchFamily="18" charset="0"/>
+                <a:cs typeface="Times New Roman" panose="02020603050405020304" pitchFamily="18" charset="0"/>
+              </a:rPr>
+              <a:t>: “</a:t>
+            </a:r>
+            <a:r>
+              <a:rPr lang="en-US" dirty="0" err="1">
+                <a:latin typeface="Times New Roman" panose="02020603050405020304" pitchFamily="18" charset="0"/>
+                <a:cs typeface="Times New Roman" panose="02020603050405020304" pitchFamily="18" charset="0"/>
+              </a:rPr>
+              <a:t>Vẽ</a:t>
+            </a:r>
+            <a:r>
+              <a:rPr lang="en-US" dirty="0">
+                <a:latin typeface="Times New Roman" panose="02020603050405020304" pitchFamily="18" charset="0"/>
+                <a:cs typeface="Times New Roman" panose="02020603050405020304" pitchFamily="18" charset="0"/>
+              </a:rPr>
+              <a:t> </a:t>
+            </a:r>
+            <a:r>
+              <a:rPr lang="en-US" dirty="0" err="1">
+                <a:latin typeface="Times New Roman" panose="02020603050405020304" pitchFamily="18" charset="0"/>
+                <a:cs typeface="Times New Roman" panose="02020603050405020304" pitchFamily="18" charset="0"/>
+              </a:rPr>
+              <a:t>hình</a:t>
+            </a:r>
+            <a:r>
+              <a:rPr lang="en-US" dirty="0">
+                <a:latin typeface="Times New Roman" panose="02020603050405020304" pitchFamily="18" charset="0"/>
+                <a:cs typeface="Times New Roman" panose="02020603050405020304" pitchFamily="18" charset="0"/>
+              </a:rPr>
+              <a:t>”, “</a:t>
+            </a:r>
+            <a:r>
+              <a:rPr lang="en-US" dirty="0" err="1">
+                <a:latin typeface="Times New Roman" panose="02020603050405020304" pitchFamily="18" charset="0"/>
+                <a:cs typeface="Times New Roman" panose="02020603050405020304" pitchFamily="18" charset="0"/>
+              </a:rPr>
+              <a:t>Tính</a:t>
+            </a:r>
+            <a:r>
+              <a:rPr lang="en-US" dirty="0">
+                <a:latin typeface="Times New Roman" panose="02020603050405020304" pitchFamily="18" charset="0"/>
+                <a:cs typeface="Times New Roman" panose="02020603050405020304" pitchFamily="18" charset="0"/>
+              </a:rPr>
+              <a:t> </a:t>
+            </a:r>
+            <a:r>
+              <a:rPr lang="en-US" dirty="0" err="1">
+                <a:latin typeface="Times New Roman" panose="02020603050405020304" pitchFamily="18" charset="0"/>
+                <a:cs typeface="Times New Roman" panose="02020603050405020304" pitchFamily="18" charset="0"/>
+              </a:rPr>
+              <a:t>diện</a:t>
+            </a:r>
+            <a:r>
+              <a:rPr lang="en-US" dirty="0">
+                <a:latin typeface="Times New Roman" panose="02020603050405020304" pitchFamily="18" charset="0"/>
+                <a:cs typeface="Times New Roman" panose="02020603050405020304" pitchFamily="18" charset="0"/>
+              </a:rPr>
+              <a:t> </a:t>
+            </a:r>
+            <a:r>
+              <a:rPr lang="en-US" dirty="0" err="1">
+                <a:latin typeface="Times New Roman" panose="02020603050405020304" pitchFamily="18" charset="0"/>
+                <a:cs typeface="Times New Roman" panose="02020603050405020304" pitchFamily="18" charset="0"/>
+              </a:rPr>
+              <a:t>tích</a:t>
+            </a:r>
+            <a:r>
+              <a:rPr lang="en-US" dirty="0">
+                <a:latin typeface="Times New Roman" panose="02020603050405020304" pitchFamily="18" charset="0"/>
+                <a:cs typeface="Times New Roman" panose="02020603050405020304" pitchFamily="18" charset="0"/>
+              </a:rPr>
+              <a:t>”, “</a:t>
+            </a:r>
+            <a:r>
+              <a:rPr lang="en-US" dirty="0" err="1">
+                <a:latin typeface="Times New Roman" panose="02020603050405020304" pitchFamily="18" charset="0"/>
+                <a:cs typeface="Times New Roman" panose="02020603050405020304" pitchFamily="18" charset="0"/>
+              </a:rPr>
+              <a:t>Tính</a:t>
+            </a:r>
+            <a:r>
+              <a:rPr lang="en-US" dirty="0">
+                <a:latin typeface="Times New Roman" panose="02020603050405020304" pitchFamily="18" charset="0"/>
+                <a:cs typeface="Times New Roman" panose="02020603050405020304" pitchFamily="18" charset="0"/>
+              </a:rPr>
+              <a:t> chu vi”… </a:t>
+            </a:r>
+            <a:r>
+              <a:rPr lang="en-US" dirty="0" err="1">
+                <a:latin typeface="Times New Roman" panose="02020603050405020304" pitchFamily="18" charset="0"/>
+                <a:cs typeface="Times New Roman" panose="02020603050405020304" pitchFamily="18" charset="0"/>
+              </a:rPr>
+              <a:t>nh</a:t>
+            </a:r>
+            <a:r>
+              <a:rPr lang="vi-VN" dirty="0">
+                <a:latin typeface="Times New Roman" panose="02020603050405020304" pitchFamily="18" charset="0"/>
+                <a:cs typeface="Times New Roman" panose="02020603050405020304" pitchFamily="18" charset="0"/>
+              </a:rPr>
+              <a:t>ư</a:t>
+            </a:r>
+            <a:r>
+              <a:rPr lang="en-US" dirty="0">
+                <a:latin typeface="Times New Roman" panose="02020603050405020304" pitchFamily="18" charset="0"/>
+                <a:cs typeface="Times New Roman" panose="02020603050405020304" pitchFamily="18" charset="0"/>
+              </a:rPr>
+              <a:t>ng </a:t>
+            </a:r>
+            <a:r>
+              <a:rPr lang="en-US" dirty="0" err="1">
+                <a:latin typeface="Times New Roman" panose="02020603050405020304" pitchFamily="18" charset="0"/>
+                <a:cs typeface="Times New Roman" panose="02020603050405020304" pitchFamily="18" charset="0"/>
+              </a:rPr>
+              <a:t>khi</a:t>
+            </a:r>
+            <a:r>
+              <a:rPr lang="en-US" dirty="0">
+                <a:latin typeface="Times New Roman" panose="02020603050405020304" pitchFamily="18" charset="0"/>
+                <a:cs typeface="Times New Roman" panose="02020603050405020304" pitchFamily="18" charset="0"/>
+              </a:rPr>
+              <a:t> </a:t>
+            </a:r>
+            <a:r>
+              <a:rPr lang="en-US" dirty="0" err="1">
+                <a:latin typeface="Times New Roman" panose="02020603050405020304" pitchFamily="18" charset="0"/>
+                <a:cs typeface="Times New Roman" panose="02020603050405020304" pitchFamily="18" charset="0"/>
+              </a:rPr>
+              <a:t>triển</a:t>
+            </a:r>
+            <a:r>
+              <a:rPr lang="en-US" dirty="0">
+                <a:latin typeface="Times New Roman" panose="02020603050405020304" pitchFamily="18" charset="0"/>
+                <a:cs typeface="Times New Roman" panose="02020603050405020304" pitchFamily="18" charset="0"/>
+              </a:rPr>
+              <a:t> </a:t>
+            </a:r>
+            <a:r>
+              <a:rPr lang="en-US" dirty="0" err="1">
+                <a:latin typeface="Times New Roman" panose="02020603050405020304" pitchFamily="18" charset="0"/>
+                <a:cs typeface="Times New Roman" panose="02020603050405020304" pitchFamily="18" charset="0"/>
+              </a:rPr>
+              <a:t>khai</a:t>
+            </a:r>
+            <a:r>
+              <a:rPr lang="en-US" dirty="0">
+                <a:latin typeface="Times New Roman" panose="02020603050405020304" pitchFamily="18" charset="0"/>
+                <a:cs typeface="Times New Roman" panose="02020603050405020304" pitchFamily="18" charset="0"/>
+              </a:rPr>
+              <a:t> </a:t>
+            </a:r>
+            <a:r>
+              <a:rPr lang="en-US" dirty="0" err="1">
+                <a:latin typeface="Times New Roman" panose="02020603050405020304" pitchFamily="18" charset="0"/>
+                <a:cs typeface="Times New Roman" panose="02020603050405020304" pitchFamily="18" charset="0"/>
+              </a:rPr>
+              <a:t>cụ</a:t>
+            </a:r>
+            <a:r>
+              <a:rPr lang="en-US" dirty="0">
+                <a:latin typeface="Times New Roman" panose="02020603050405020304" pitchFamily="18" charset="0"/>
+                <a:cs typeface="Times New Roman" panose="02020603050405020304" pitchFamily="18" charset="0"/>
+              </a:rPr>
+              <a:t> </a:t>
+            </a:r>
+            <a:r>
+              <a:rPr lang="en-US" dirty="0" err="1">
+                <a:latin typeface="Times New Roman" panose="02020603050405020304" pitchFamily="18" charset="0"/>
+                <a:cs typeface="Times New Roman" panose="02020603050405020304" pitchFamily="18" charset="0"/>
+              </a:rPr>
+              <a:t>thể</a:t>
+            </a:r>
+            <a:r>
+              <a:rPr lang="en-US" dirty="0">
+                <a:latin typeface="Times New Roman" panose="02020603050405020304" pitchFamily="18" charset="0"/>
+                <a:cs typeface="Times New Roman" panose="02020603050405020304" pitchFamily="18" charset="0"/>
+              </a:rPr>
+              <a:t> </a:t>
+            </a:r>
+            <a:r>
+              <a:rPr lang="en-US" dirty="0" err="1">
+                <a:latin typeface="Times New Roman" panose="02020603050405020304" pitchFamily="18" charset="0"/>
+                <a:cs typeface="Times New Roman" panose="02020603050405020304" pitchFamily="18" charset="0"/>
+              </a:rPr>
+              <a:t>sẽ</a:t>
+            </a:r>
+            <a:r>
+              <a:rPr lang="en-US" dirty="0">
+                <a:latin typeface="Times New Roman" panose="02020603050405020304" pitchFamily="18" charset="0"/>
+                <a:cs typeface="Times New Roman" panose="02020603050405020304" pitchFamily="18" charset="0"/>
+              </a:rPr>
+              <a:t> </a:t>
+            </a:r>
+            <a:r>
+              <a:rPr lang="en-US" dirty="0" err="1">
+                <a:latin typeface="Times New Roman" panose="02020603050405020304" pitchFamily="18" charset="0"/>
+                <a:cs typeface="Times New Roman" panose="02020603050405020304" pitchFamily="18" charset="0"/>
+              </a:rPr>
+              <a:t>khác</a:t>
+            </a:r>
+            <a:r>
+              <a:rPr lang="en-US" dirty="0">
+                <a:latin typeface="Times New Roman" panose="02020603050405020304" pitchFamily="18" charset="0"/>
+                <a:cs typeface="Times New Roman" panose="02020603050405020304" pitchFamily="18" charset="0"/>
+              </a:rPr>
+              <a:t> </a:t>
+            </a:r>
+            <a:r>
+              <a:rPr lang="en-US" dirty="0" err="1">
+                <a:latin typeface="Times New Roman" panose="02020603050405020304" pitchFamily="18" charset="0"/>
+                <a:cs typeface="Times New Roman" panose="02020603050405020304" pitchFamily="18" charset="0"/>
+              </a:rPr>
+              <a:t>nhau</a:t>
+            </a:r>
+            <a:r>
+              <a:rPr lang="en-US" dirty="0">
+                <a:latin typeface="Times New Roman" panose="02020603050405020304" pitchFamily="18" charset="0"/>
+                <a:cs typeface="Times New Roman" panose="02020603050405020304" pitchFamily="18" charset="0"/>
+              </a:rPr>
+              <a:t>. </a:t>
+            </a:r>
+            <a:r>
+              <a:rPr lang="en-US" dirty="0" err="1">
+                <a:latin typeface="Times New Roman" panose="02020603050405020304" pitchFamily="18" charset="0"/>
+                <a:cs typeface="Times New Roman" panose="02020603050405020304" pitchFamily="18" charset="0"/>
+              </a:rPr>
+              <a:t>Khi</a:t>
+            </a:r>
+            <a:r>
+              <a:rPr lang="en-US" dirty="0">
+                <a:latin typeface="Times New Roman" panose="02020603050405020304" pitchFamily="18" charset="0"/>
+                <a:cs typeface="Times New Roman" panose="02020603050405020304" pitchFamily="18" charset="0"/>
+              </a:rPr>
+              <a:t> </a:t>
+            </a:r>
+            <a:r>
+              <a:rPr lang="en-US" dirty="0" err="1">
+                <a:latin typeface="Times New Roman" panose="02020603050405020304" pitchFamily="18" charset="0"/>
+                <a:cs typeface="Times New Roman" panose="02020603050405020304" pitchFamily="18" charset="0"/>
+              </a:rPr>
+              <a:t>đó</a:t>
+            </a:r>
+            <a:r>
+              <a:rPr lang="en-US" dirty="0">
+                <a:latin typeface="Times New Roman" panose="02020603050405020304" pitchFamily="18" charset="0"/>
+                <a:cs typeface="Times New Roman" panose="02020603050405020304" pitchFamily="18" charset="0"/>
+              </a:rPr>
+              <a:t> ta </a:t>
+            </a:r>
+            <a:r>
+              <a:rPr lang="en-US" dirty="0" err="1">
+                <a:latin typeface="Times New Roman" panose="02020603050405020304" pitchFamily="18" charset="0"/>
+                <a:cs typeface="Times New Roman" panose="02020603050405020304" pitchFamily="18" charset="0"/>
+              </a:rPr>
+              <a:t>cần</a:t>
+            </a:r>
+            <a:r>
+              <a:rPr lang="en-US" dirty="0">
+                <a:latin typeface="Times New Roman" panose="02020603050405020304" pitchFamily="18" charset="0"/>
+                <a:cs typeface="Times New Roman" panose="02020603050405020304" pitchFamily="18" charset="0"/>
+              </a:rPr>
+              <a:t> Factory Design Pattern.</a:t>
+            </a:r>
+          </a:p>
+          <a:p>
+            <a:pPr algn="just"/>
+            <a:r>
+              <a:rPr lang="en-US" dirty="0" err="1">
+                <a:latin typeface="Times New Roman" panose="02020603050405020304" pitchFamily="18" charset="0"/>
+                <a:cs typeface="Times New Roman" panose="02020603050405020304" pitchFamily="18" charset="0"/>
+              </a:rPr>
+              <a:t>Các</a:t>
+            </a:r>
+            <a:r>
+              <a:rPr lang="en-US" dirty="0">
+                <a:latin typeface="Times New Roman" panose="02020603050405020304" pitchFamily="18" charset="0"/>
+                <a:cs typeface="Times New Roman" panose="02020603050405020304" pitchFamily="18" charset="0"/>
+              </a:rPr>
+              <a:t> b</a:t>
+            </a:r>
+            <a:r>
+              <a:rPr lang="vi-VN" dirty="0">
+                <a:latin typeface="Times New Roman" panose="02020603050405020304" pitchFamily="18" charset="0"/>
+                <a:cs typeface="Times New Roman" panose="02020603050405020304" pitchFamily="18" charset="0"/>
+              </a:rPr>
+              <a:t>ư</a:t>
+            </a:r>
+            <a:r>
+              <a:rPr lang="en-US" dirty="0" err="1">
+                <a:latin typeface="Times New Roman" panose="02020603050405020304" pitchFamily="18" charset="0"/>
+                <a:cs typeface="Times New Roman" panose="02020603050405020304" pitchFamily="18" charset="0"/>
+              </a:rPr>
+              <a:t>ớc</a:t>
+            </a:r>
+            <a:r>
+              <a:rPr lang="en-US" dirty="0">
+                <a:latin typeface="Times New Roman" panose="02020603050405020304" pitchFamily="18" charset="0"/>
+                <a:cs typeface="Times New Roman" panose="02020603050405020304" pitchFamily="18" charset="0"/>
+              </a:rPr>
+              <a:t> c</a:t>
+            </a:r>
+            <a:r>
+              <a:rPr lang="vi-VN" dirty="0">
+                <a:latin typeface="Times New Roman" panose="02020603050405020304" pitchFamily="18" charset="0"/>
+                <a:cs typeface="Times New Roman" panose="02020603050405020304" pitchFamily="18" charset="0"/>
+              </a:rPr>
+              <a:t>ơ</a:t>
+            </a:r>
+            <a:r>
+              <a:rPr lang="en-US" dirty="0">
+                <a:latin typeface="Times New Roman" panose="02020603050405020304" pitchFamily="18" charset="0"/>
+                <a:cs typeface="Times New Roman" panose="02020603050405020304" pitchFamily="18" charset="0"/>
+              </a:rPr>
+              <a:t> </a:t>
+            </a:r>
+            <a:r>
+              <a:rPr lang="en-US" dirty="0" err="1">
+                <a:latin typeface="Times New Roman" panose="02020603050405020304" pitchFamily="18" charset="0"/>
+                <a:cs typeface="Times New Roman" panose="02020603050405020304" pitchFamily="18" charset="0"/>
+              </a:rPr>
+              <a:t>bản</a:t>
+            </a:r>
+            <a:r>
+              <a:rPr lang="en-US" dirty="0">
+                <a:latin typeface="Times New Roman" panose="02020603050405020304" pitchFamily="18" charset="0"/>
+                <a:cs typeface="Times New Roman" panose="02020603050405020304" pitchFamily="18" charset="0"/>
+              </a:rPr>
+              <a:t> </a:t>
+            </a:r>
+            <a:r>
+              <a:rPr lang="en-US" dirty="0" err="1">
+                <a:latin typeface="Times New Roman" panose="02020603050405020304" pitchFamily="18" charset="0"/>
+                <a:cs typeface="Times New Roman" panose="02020603050405020304" pitchFamily="18" charset="0"/>
+              </a:rPr>
+              <a:t>để</a:t>
+            </a:r>
+            <a:r>
+              <a:rPr lang="en-US" dirty="0">
+                <a:latin typeface="Times New Roman" panose="02020603050405020304" pitchFamily="18" charset="0"/>
+                <a:cs typeface="Times New Roman" panose="02020603050405020304" pitchFamily="18" charset="0"/>
+              </a:rPr>
+              <a:t> </a:t>
+            </a:r>
+            <a:r>
+              <a:rPr lang="en-US" dirty="0" err="1">
+                <a:latin typeface="Times New Roman" panose="02020603050405020304" pitchFamily="18" charset="0"/>
+                <a:cs typeface="Times New Roman" panose="02020603050405020304" pitchFamily="18" charset="0"/>
+              </a:rPr>
+              <a:t>triển</a:t>
+            </a:r>
+            <a:r>
+              <a:rPr lang="en-US" dirty="0">
+                <a:latin typeface="Times New Roman" panose="02020603050405020304" pitchFamily="18" charset="0"/>
+                <a:cs typeface="Times New Roman" panose="02020603050405020304" pitchFamily="18" charset="0"/>
+              </a:rPr>
+              <a:t> </a:t>
+            </a:r>
+            <a:r>
+              <a:rPr lang="en-US" dirty="0" err="1">
+                <a:latin typeface="Times New Roman" panose="02020603050405020304" pitchFamily="18" charset="0"/>
+                <a:cs typeface="Times New Roman" panose="02020603050405020304" pitchFamily="18" charset="0"/>
+              </a:rPr>
+              <a:t>khai</a:t>
+            </a:r>
+            <a:r>
+              <a:rPr lang="en-US" dirty="0">
+                <a:latin typeface="Times New Roman" panose="02020603050405020304" pitchFamily="18" charset="0"/>
+                <a:cs typeface="Times New Roman" panose="02020603050405020304" pitchFamily="18" charset="0"/>
+              </a:rPr>
+              <a:t> Factory Design Pattern:</a:t>
+            </a:r>
+          </a:p>
+          <a:p>
+            <a:pPr lvl="1" algn="just"/>
+            <a:r>
+              <a:rPr lang="en-US" dirty="0" err="1">
+                <a:latin typeface="Times New Roman" panose="02020603050405020304" pitchFamily="18" charset="0"/>
+                <a:cs typeface="Times New Roman" panose="02020603050405020304" pitchFamily="18" charset="0"/>
+              </a:rPr>
+              <a:t>Tạo</a:t>
+            </a:r>
+            <a:r>
+              <a:rPr lang="en-US" dirty="0">
+                <a:latin typeface="Times New Roman" panose="02020603050405020304" pitchFamily="18" charset="0"/>
+                <a:cs typeface="Times New Roman" panose="02020603050405020304" pitchFamily="18" charset="0"/>
+              </a:rPr>
+              <a:t> </a:t>
+            </a:r>
+            <a:r>
+              <a:rPr lang="en-US" dirty="0" err="1">
+                <a:latin typeface="Times New Roman" panose="02020603050405020304" pitchFamily="18" charset="0"/>
+                <a:cs typeface="Times New Roman" panose="02020603050405020304" pitchFamily="18" charset="0"/>
+              </a:rPr>
+              <a:t>một</a:t>
+            </a:r>
+            <a:r>
+              <a:rPr lang="en-US" dirty="0">
+                <a:latin typeface="Times New Roman" panose="02020603050405020304" pitchFamily="18" charset="0"/>
+                <a:cs typeface="Times New Roman" panose="02020603050405020304" pitchFamily="18" charset="0"/>
+              </a:rPr>
+              <a:t> Base Class </a:t>
+            </a:r>
+            <a:r>
+              <a:rPr lang="en-US" dirty="0" err="1">
+                <a:latin typeface="Times New Roman" panose="02020603050405020304" pitchFamily="18" charset="0"/>
+                <a:cs typeface="Times New Roman" panose="02020603050405020304" pitchFamily="18" charset="0"/>
+              </a:rPr>
+              <a:t>là</a:t>
+            </a:r>
+            <a:r>
+              <a:rPr lang="en-US" dirty="0">
+                <a:latin typeface="Times New Roman" panose="02020603050405020304" pitchFamily="18" charset="0"/>
+                <a:cs typeface="Times New Roman" panose="02020603050405020304" pitchFamily="18" charset="0"/>
+              </a:rPr>
+              <a:t> Abstract Class </a:t>
+            </a:r>
+            <a:r>
+              <a:rPr lang="en-US" dirty="0" err="1">
+                <a:latin typeface="Times New Roman" panose="02020603050405020304" pitchFamily="18" charset="0"/>
+                <a:cs typeface="Times New Roman" panose="02020603050405020304" pitchFamily="18" charset="0"/>
+              </a:rPr>
+              <a:t>với</a:t>
+            </a:r>
+            <a:r>
+              <a:rPr lang="en-US" dirty="0">
+                <a:latin typeface="Times New Roman" panose="02020603050405020304" pitchFamily="18" charset="0"/>
+                <a:cs typeface="Times New Roman" panose="02020603050405020304" pitchFamily="18" charset="0"/>
+              </a:rPr>
+              <a:t> </a:t>
+            </a:r>
+            <a:r>
+              <a:rPr lang="en-US" dirty="0" err="1">
+                <a:latin typeface="Times New Roman" panose="02020603050405020304" pitchFamily="18" charset="0"/>
+                <a:cs typeface="Times New Roman" panose="02020603050405020304" pitchFamily="18" charset="0"/>
+              </a:rPr>
+              <a:t>các</a:t>
+            </a:r>
+            <a:r>
+              <a:rPr lang="en-US" dirty="0">
+                <a:latin typeface="Times New Roman" panose="02020603050405020304" pitchFamily="18" charset="0"/>
+                <a:cs typeface="Times New Roman" panose="02020603050405020304" pitchFamily="18" charset="0"/>
+              </a:rPr>
+              <a:t> Virtual functions &amp; virtual methods </a:t>
+            </a:r>
+            <a:r>
+              <a:rPr lang="en-US" dirty="0" err="1">
+                <a:latin typeface="Times New Roman" panose="02020603050405020304" pitchFamily="18" charset="0"/>
+                <a:cs typeface="Times New Roman" panose="02020603050405020304" pitchFamily="18" charset="0"/>
+              </a:rPr>
+              <a:t>để</a:t>
+            </a:r>
+            <a:r>
+              <a:rPr lang="en-US" dirty="0">
+                <a:latin typeface="Times New Roman" panose="02020603050405020304" pitchFamily="18" charset="0"/>
+                <a:cs typeface="Times New Roman" panose="02020603050405020304" pitchFamily="18" charset="0"/>
+              </a:rPr>
+              <a:t> </a:t>
+            </a:r>
+            <a:r>
+              <a:rPr lang="en-US" dirty="0" err="1">
+                <a:latin typeface="Times New Roman" panose="02020603050405020304" pitchFamily="18" charset="0"/>
+                <a:cs typeface="Times New Roman" panose="02020603050405020304" pitchFamily="18" charset="0"/>
+              </a:rPr>
+              <a:t>các</a:t>
+            </a:r>
+            <a:r>
+              <a:rPr lang="en-US" dirty="0">
+                <a:latin typeface="Times New Roman" panose="02020603050405020304" pitchFamily="18" charset="0"/>
+                <a:cs typeface="Times New Roman" panose="02020603050405020304" pitchFamily="18" charset="0"/>
+              </a:rPr>
+              <a:t> Child Classes </a:t>
+            </a:r>
+            <a:r>
+              <a:rPr lang="en-US" dirty="0" err="1">
+                <a:latin typeface="Times New Roman" panose="02020603050405020304" pitchFamily="18" charset="0"/>
+                <a:cs typeface="Times New Roman" panose="02020603050405020304" pitchFamily="18" charset="0"/>
+              </a:rPr>
+              <a:t>có</a:t>
+            </a:r>
+            <a:r>
+              <a:rPr lang="en-US" dirty="0">
+                <a:latin typeface="Times New Roman" panose="02020603050405020304" pitchFamily="18" charset="0"/>
+                <a:cs typeface="Times New Roman" panose="02020603050405020304" pitchFamily="18" charset="0"/>
+              </a:rPr>
+              <a:t> </a:t>
+            </a:r>
+            <a:r>
+              <a:rPr lang="en-US" dirty="0" err="1">
+                <a:latin typeface="Times New Roman" panose="02020603050405020304" pitchFamily="18" charset="0"/>
+                <a:cs typeface="Times New Roman" panose="02020603050405020304" pitchFamily="18" charset="0"/>
+              </a:rPr>
+              <a:t>thể</a:t>
+            </a:r>
+            <a:r>
+              <a:rPr lang="en-US" dirty="0">
+                <a:latin typeface="Times New Roman" panose="02020603050405020304" pitchFamily="18" charset="0"/>
+                <a:cs typeface="Times New Roman" panose="02020603050405020304" pitchFamily="18" charset="0"/>
+              </a:rPr>
+              <a:t> override </a:t>
+            </a:r>
+            <a:r>
+              <a:rPr lang="en-US" dirty="0" err="1">
+                <a:latin typeface="Times New Roman" panose="02020603050405020304" pitchFamily="18" charset="0"/>
+                <a:cs typeface="Times New Roman" panose="02020603050405020304" pitchFamily="18" charset="0"/>
+              </a:rPr>
+              <a:t>cho</a:t>
+            </a:r>
+            <a:r>
+              <a:rPr lang="en-US" dirty="0">
+                <a:latin typeface="Times New Roman" panose="02020603050405020304" pitchFamily="18" charset="0"/>
+                <a:cs typeface="Times New Roman" panose="02020603050405020304" pitchFamily="18" charset="0"/>
+              </a:rPr>
+              <a:t> tr</a:t>
+            </a:r>
+            <a:r>
+              <a:rPr lang="vi-VN" dirty="0">
+                <a:latin typeface="Times New Roman" panose="02020603050405020304" pitchFamily="18" charset="0"/>
+                <a:cs typeface="Times New Roman" panose="02020603050405020304" pitchFamily="18" charset="0"/>
+              </a:rPr>
+              <a:t>ư</a:t>
+            </a:r>
+            <a:r>
+              <a:rPr lang="en-US" dirty="0" err="1">
+                <a:latin typeface="Times New Roman" panose="02020603050405020304" pitchFamily="18" charset="0"/>
+                <a:cs typeface="Times New Roman" panose="02020603050405020304" pitchFamily="18" charset="0"/>
+              </a:rPr>
+              <a:t>ờng</a:t>
+            </a:r>
+            <a:r>
+              <a:rPr lang="en-US" dirty="0">
+                <a:latin typeface="Times New Roman" panose="02020603050405020304" pitchFamily="18" charset="0"/>
+                <a:cs typeface="Times New Roman" panose="02020603050405020304" pitchFamily="18" charset="0"/>
+              </a:rPr>
+              <a:t> </a:t>
+            </a:r>
+            <a:r>
+              <a:rPr lang="en-US" dirty="0" err="1">
+                <a:latin typeface="Times New Roman" panose="02020603050405020304" pitchFamily="18" charset="0"/>
+                <a:cs typeface="Times New Roman" panose="02020603050405020304" pitchFamily="18" charset="0"/>
+              </a:rPr>
+              <a:t>hợp</a:t>
+            </a:r>
+            <a:r>
+              <a:rPr lang="en-US" dirty="0">
+                <a:latin typeface="Times New Roman" panose="02020603050405020304" pitchFamily="18" charset="0"/>
+                <a:cs typeface="Times New Roman" panose="02020603050405020304" pitchFamily="18" charset="0"/>
+              </a:rPr>
+              <a:t> </a:t>
+            </a:r>
+            <a:r>
+              <a:rPr lang="en-US" dirty="0" err="1">
+                <a:latin typeface="Times New Roman" panose="02020603050405020304" pitchFamily="18" charset="0"/>
+                <a:cs typeface="Times New Roman" panose="02020603050405020304" pitchFamily="18" charset="0"/>
+              </a:rPr>
+              <a:t>cụ</a:t>
+            </a:r>
+            <a:r>
+              <a:rPr lang="en-US" dirty="0">
+                <a:latin typeface="Times New Roman" panose="02020603050405020304" pitchFamily="18" charset="0"/>
+                <a:cs typeface="Times New Roman" panose="02020603050405020304" pitchFamily="18" charset="0"/>
+              </a:rPr>
+              <a:t> </a:t>
+            </a:r>
+            <a:r>
+              <a:rPr lang="en-US" dirty="0" err="1">
+                <a:latin typeface="Times New Roman" panose="02020603050405020304" pitchFamily="18" charset="0"/>
+                <a:cs typeface="Times New Roman" panose="02020603050405020304" pitchFamily="18" charset="0"/>
+              </a:rPr>
+              <a:t>thể</a:t>
+            </a:r>
+            <a:r>
+              <a:rPr lang="en-US" dirty="0">
+                <a:latin typeface="Times New Roman" panose="02020603050405020304" pitchFamily="18" charset="0"/>
+                <a:cs typeface="Times New Roman" panose="02020603050405020304" pitchFamily="18" charset="0"/>
+              </a:rPr>
+              <a:t> </a:t>
+            </a:r>
+            <a:r>
+              <a:rPr lang="en-US" dirty="0" err="1">
+                <a:latin typeface="Times New Roman" panose="02020603050405020304" pitchFamily="18" charset="0"/>
+                <a:cs typeface="Times New Roman" panose="02020603050405020304" pitchFamily="18" charset="0"/>
+              </a:rPr>
+              <a:t>của</a:t>
+            </a:r>
+            <a:r>
+              <a:rPr lang="en-US" dirty="0">
+                <a:latin typeface="Times New Roman" panose="02020603050405020304" pitchFamily="18" charset="0"/>
+                <a:cs typeface="Times New Roman" panose="02020603050405020304" pitchFamily="18" charset="0"/>
+              </a:rPr>
+              <a:t> </a:t>
+            </a:r>
+            <a:r>
+              <a:rPr lang="en-US" dirty="0" err="1">
+                <a:latin typeface="Times New Roman" panose="02020603050405020304" pitchFamily="18" charset="0"/>
+                <a:cs typeface="Times New Roman" panose="02020603050405020304" pitchFamily="18" charset="0"/>
+              </a:rPr>
+              <a:t>mình</a:t>
+            </a:r>
+            <a:r>
+              <a:rPr lang="en-US" dirty="0">
+                <a:latin typeface="Times New Roman" panose="02020603050405020304" pitchFamily="18" charset="0"/>
+                <a:cs typeface="Times New Roman" panose="02020603050405020304" pitchFamily="18" charset="0"/>
+              </a:rPr>
+              <a:t>.</a:t>
+            </a:r>
+          </a:p>
+          <a:p>
+            <a:pPr lvl="1" algn="just"/>
+            <a:r>
+              <a:rPr lang="en-US" dirty="0" err="1">
+                <a:latin typeface="Times New Roman" panose="02020603050405020304" pitchFamily="18" charset="0"/>
+                <a:cs typeface="Times New Roman" panose="02020603050405020304" pitchFamily="18" charset="0"/>
+              </a:rPr>
+              <a:t>Triển</a:t>
+            </a:r>
+            <a:r>
+              <a:rPr lang="en-US" dirty="0">
+                <a:latin typeface="Times New Roman" panose="02020603050405020304" pitchFamily="18" charset="0"/>
+                <a:cs typeface="Times New Roman" panose="02020603050405020304" pitchFamily="18" charset="0"/>
+              </a:rPr>
+              <a:t> </a:t>
+            </a:r>
+            <a:r>
+              <a:rPr lang="en-US" dirty="0" err="1">
+                <a:latin typeface="Times New Roman" panose="02020603050405020304" pitchFamily="18" charset="0"/>
+                <a:cs typeface="Times New Roman" panose="02020603050405020304" pitchFamily="18" charset="0"/>
+              </a:rPr>
+              <a:t>khai</a:t>
+            </a:r>
+            <a:r>
+              <a:rPr lang="en-US" dirty="0">
+                <a:latin typeface="Times New Roman" panose="02020603050405020304" pitchFamily="18" charset="0"/>
+                <a:cs typeface="Times New Roman" panose="02020603050405020304" pitchFamily="18" charset="0"/>
+              </a:rPr>
+              <a:t> </a:t>
+            </a:r>
+            <a:r>
+              <a:rPr lang="en-US" dirty="0" err="1">
+                <a:latin typeface="Times New Roman" panose="02020603050405020304" pitchFamily="18" charset="0"/>
+                <a:cs typeface="Times New Roman" panose="02020603050405020304" pitchFamily="18" charset="0"/>
+              </a:rPr>
+              <a:t>các</a:t>
+            </a:r>
+            <a:r>
+              <a:rPr lang="en-US" dirty="0">
+                <a:latin typeface="Times New Roman" panose="02020603050405020304" pitchFamily="18" charset="0"/>
+                <a:cs typeface="Times New Roman" panose="02020603050405020304" pitchFamily="18" charset="0"/>
+              </a:rPr>
+              <a:t> Child Classes </a:t>
+            </a:r>
+            <a:r>
+              <a:rPr lang="en-US" dirty="0" err="1">
+                <a:latin typeface="Times New Roman" panose="02020603050405020304" pitchFamily="18" charset="0"/>
+                <a:cs typeface="Times New Roman" panose="02020603050405020304" pitchFamily="18" charset="0"/>
+              </a:rPr>
+              <a:t>có</a:t>
+            </a:r>
+            <a:r>
+              <a:rPr lang="en-US" dirty="0">
+                <a:latin typeface="Times New Roman" panose="02020603050405020304" pitchFamily="18" charset="0"/>
+                <a:cs typeface="Times New Roman" panose="02020603050405020304" pitchFamily="18" charset="0"/>
+              </a:rPr>
+              <a:t> </a:t>
+            </a:r>
+            <a:r>
+              <a:rPr lang="en-US" dirty="0" err="1">
+                <a:latin typeface="Times New Roman" panose="02020603050405020304" pitchFamily="18" charset="0"/>
+                <a:cs typeface="Times New Roman" panose="02020603050405020304" pitchFamily="18" charset="0"/>
+              </a:rPr>
+              <a:t>các</a:t>
+            </a:r>
+            <a:r>
+              <a:rPr lang="en-US" dirty="0">
+                <a:latin typeface="Times New Roman" panose="02020603050405020304" pitchFamily="18" charset="0"/>
+                <a:cs typeface="Times New Roman" panose="02020603050405020304" pitchFamily="18" charset="0"/>
+              </a:rPr>
+              <a:t> functions </a:t>
+            </a:r>
+            <a:r>
+              <a:rPr lang="en-US" dirty="0" err="1">
+                <a:latin typeface="Times New Roman" panose="02020603050405020304" pitchFamily="18" charset="0"/>
+                <a:cs typeface="Times New Roman" panose="02020603050405020304" pitchFamily="18" charset="0"/>
+              </a:rPr>
+              <a:t>và</a:t>
+            </a:r>
+            <a:r>
+              <a:rPr lang="en-US" dirty="0">
+                <a:latin typeface="Times New Roman" panose="02020603050405020304" pitchFamily="18" charset="0"/>
+                <a:cs typeface="Times New Roman" panose="02020603050405020304" pitchFamily="18" charset="0"/>
+              </a:rPr>
+              <a:t> methods override </a:t>
+            </a:r>
+            <a:r>
+              <a:rPr lang="en-US" dirty="0" err="1">
+                <a:latin typeface="Times New Roman" panose="02020603050405020304" pitchFamily="18" charset="0"/>
+                <a:cs typeface="Times New Roman" panose="02020603050405020304" pitchFamily="18" charset="0"/>
+              </a:rPr>
+              <a:t>các</a:t>
+            </a:r>
+            <a:r>
+              <a:rPr lang="en-US" dirty="0">
+                <a:latin typeface="Times New Roman" panose="02020603050405020304" pitchFamily="18" charset="0"/>
+                <a:cs typeface="Times New Roman" panose="02020603050405020304" pitchFamily="18" charset="0"/>
+              </a:rPr>
+              <a:t> functions </a:t>
+            </a:r>
+            <a:r>
+              <a:rPr lang="en-US" dirty="0" err="1">
+                <a:latin typeface="Times New Roman" panose="02020603050405020304" pitchFamily="18" charset="0"/>
+                <a:cs typeface="Times New Roman" panose="02020603050405020304" pitchFamily="18" charset="0"/>
+              </a:rPr>
+              <a:t>và</a:t>
+            </a:r>
+            <a:r>
+              <a:rPr lang="en-US" dirty="0">
+                <a:latin typeface="Times New Roman" panose="02020603050405020304" pitchFamily="18" charset="0"/>
+                <a:cs typeface="Times New Roman" panose="02020603050405020304" pitchFamily="18" charset="0"/>
+              </a:rPr>
+              <a:t> methods ở Base Class, </a:t>
+            </a:r>
+            <a:r>
+              <a:rPr lang="en-US" dirty="0" err="1">
+                <a:latin typeface="Times New Roman" panose="02020603050405020304" pitchFamily="18" charset="0"/>
+                <a:cs typeface="Times New Roman" panose="02020603050405020304" pitchFamily="18" charset="0"/>
+              </a:rPr>
+              <a:t>với</a:t>
+            </a:r>
+            <a:r>
+              <a:rPr lang="en-US" dirty="0">
+                <a:latin typeface="Times New Roman" panose="02020603050405020304" pitchFamily="18" charset="0"/>
+                <a:cs typeface="Times New Roman" panose="02020603050405020304" pitchFamily="18" charset="0"/>
+              </a:rPr>
+              <a:t> </a:t>
+            </a:r>
+            <a:r>
+              <a:rPr lang="en-US" dirty="0" err="1">
+                <a:latin typeface="Times New Roman" panose="02020603050405020304" pitchFamily="18" charset="0"/>
+                <a:cs typeface="Times New Roman" panose="02020603050405020304" pitchFamily="18" charset="0"/>
+              </a:rPr>
+              <a:t>các</a:t>
+            </a:r>
+            <a:r>
+              <a:rPr lang="en-US" dirty="0">
+                <a:latin typeface="Times New Roman" panose="02020603050405020304" pitchFamily="18" charset="0"/>
+                <a:cs typeface="Times New Roman" panose="02020603050405020304" pitchFamily="18" charset="0"/>
+              </a:rPr>
+              <a:t> </a:t>
+            </a:r>
+            <a:r>
+              <a:rPr lang="en-US" dirty="0" err="1">
+                <a:latin typeface="Times New Roman" panose="02020603050405020304" pitchFamily="18" charset="0"/>
+                <a:cs typeface="Times New Roman" panose="02020603050405020304" pitchFamily="18" charset="0"/>
+              </a:rPr>
+              <a:t>đặc</a:t>
+            </a:r>
+            <a:r>
+              <a:rPr lang="en-US" dirty="0">
+                <a:latin typeface="Times New Roman" panose="02020603050405020304" pitchFamily="18" charset="0"/>
+                <a:cs typeface="Times New Roman" panose="02020603050405020304" pitchFamily="18" charset="0"/>
+              </a:rPr>
+              <a:t> </a:t>
+            </a:r>
+            <a:r>
+              <a:rPr lang="en-US" dirty="0" err="1">
+                <a:latin typeface="Times New Roman" panose="02020603050405020304" pitchFamily="18" charset="0"/>
+                <a:cs typeface="Times New Roman" panose="02020603050405020304" pitchFamily="18" charset="0"/>
+              </a:rPr>
+              <a:t>điểm</a:t>
+            </a:r>
+            <a:r>
+              <a:rPr lang="en-US" dirty="0">
+                <a:latin typeface="Times New Roman" panose="02020603050405020304" pitchFamily="18" charset="0"/>
+                <a:cs typeface="Times New Roman" panose="02020603050405020304" pitchFamily="18" charset="0"/>
+              </a:rPr>
+              <a:t> </a:t>
+            </a:r>
+            <a:r>
+              <a:rPr lang="en-US" dirty="0" err="1">
+                <a:latin typeface="Times New Roman" panose="02020603050405020304" pitchFamily="18" charset="0"/>
+                <a:cs typeface="Times New Roman" panose="02020603050405020304" pitchFamily="18" charset="0"/>
+              </a:rPr>
+              <a:t>riêng</a:t>
+            </a:r>
+            <a:r>
+              <a:rPr lang="en-US" dirty="0">
+                <a:latin typeface="Times New Roman" panose="02020603050405020304" pitchFamily="18" charset="0"/>
+                <a:cs typeface="Times New Roman" panose="02020603050405020304" pitchFamily="18" charset="0"/>
+              </a:rPr>
+              <a:t> </a:t>
+            </a:r>
+            <a:r>
+              <a:rPr lang="en-US" dirty="0" err="1">
+                <a:latin typeface="Times New Roman" panose="02020603050405020304" pitchFamily="18" charset="0"/>
+                <a:cs typeface="Times New Roman" panose="02020603050405020304" pitchFamily="18" charset="0"/>
+              </a:rPr>
+              <a:t>theo</a:t>
+            </a:r>
+            <a:r>
+              <a:rPr lang="en-US" dirty="0">
+                <a:latin typeface="Times New Roman" panose="02020603050405020304" pitchFamily="18" charset="0"/>
+                <a:cs typeface="Times New Roman" panose="02020603050405020304" pitchFamily="18" charset="0"/>
+              </a:rPr>
+              <a:t> </a:t>
+            </a:r>
+            <a:r>
+              <a:rPr lang="en-US" dirty="0" err="1">
+                <a:latin typeface="Times New Roman" panose="02020603050405020304" pitchFamily="18" charset="0"/>
+                <a:cs typeface="Times New Roman" panose="02020603050405020304" pitchFamily="18" charset="0"/>
+              </a:rPr>
+              <a:t>tính</a:t>
+            </a:r>
+            <a:r>
+              <a:rPr lang="en-US" dirty="0">
+                <a:latin typeface="Times New Roman" panose="02020603050405020304" pitchFamily="18" charset="0"/>
+                <a:cs typeface="Times New Roman" panose="02020603050405020304" pitchFamily="18" charset="0"/>
+              </a:rPr>
+              <a:t> </a:t>
+            </a:r>
+            <a:r>
+              <a:rPr lang="en-US" dirty="0" err="1">
+                <a:latin typeface="Times New Roman" panose="02020603050405020304" pitchFamily="18" charset="0"/>
+                <a:cs typeface="Times New Roman" panose="02020603050405020304" pitchFamily="18" charset="0"/>
+              </a:rPr>
+              <a:t>chất</a:t>
+            </a:r>
+            <a:r>
+              <a:rPr lang="en-US" dirty="0">
+                <a:latin typeface="Times New Roman" panose="02020603050405020304" pitchFamily="18" charset="0"/>
+                <a:cs typeface="Times New Roman" panose="02020603050405020304" pitchFamily="18" charset="0"/>
+              </a:rPr>
+              <a:t> </a:t>
+            </a:r>
+            <a:r>
+              <a:rPr lang="en-US" dirty="0" err="1">
+                <a:latin typeface="Times New Roman" panose="02020603050405020304" pitchFamily="18" charset="0"/>
+                <a:cs typeface="Times New Roman" panose="02020603050405020304" pitchFamily="18" charset="0"/>
+              </a:rPr>
+              <a:t>của</a:t>
+            </a:r>
+            <a:r>
+              <a:rPr lang="en-US" dirty="0">
+                <a:latin typeface="Times New Roman" panose="02020603050405020304" pitchFamily="18" charset="0"/>
+                <a:cs typeface="Times New Roman" panose="02020603050405020304" pitchFamily="18" charset="0"/>
+              </a:rPr>
+              <a:t> </a:t>
+            </a:r>
+            <a:r>
+              <a:rPr lang="en-US" dirty="0" err="1">
+                <a:latin typeface="Times New Roman" panose="02020603050405020304" pitchFamily="18" charset="0"/>
+                <a:cs typeface="Times New Roman" panose="02020603050405020304" pitchFamily="18" charset="0"/>
+              </a:rPr>
+              <a:t>mỗi</a:t>
+            </a:r>
+            <a:r>
+              <a:rPr lang="en-US" dirty="0">
+                <a:latin typeface="Times New Roman" panose="02020603050405020304" pitchFamily="18" charset="0"/>
+                <a:cs typeface="Times New Roman" panose="02020603050405020304" pitchFamily="18" charset="0"/>
+              </a:rPr>
+              <a:t> Child Class.</a:t>
+            </a:r>
+          </a:p>
+          <a:p>
+            <a:pPr lvl="1" algn="just"/>
+            <a:r>
+              <a:rPr lang="en-US" dirty="0" err="1">
+                <a:latin typeface="Times New Roman" panose="02020603050405020304" pitchFamily="18" charset="0"/>
+                <a:cs typeface="Times New Roman" panose="02020603050405020304" pitchFamily="18" charset="0"/>
+              </a:rPr>
+              <a:t>Triển</a:t>
+            </a:r>
+            <a:r>
+              <a:rPr lang="en-US" dirty="0">
+                <a:latin typeface="Times New Roman" panose="02020603050405020304" pitchFamily="18" charset="0"/>
+                <a:cs typeface="Times New Roman" panose="02020603050405020304" pitchFamily="18" charset="0"/>
+              </a:rPr>
+              <a:t> </a:t>
+            </a:r>
+            <a:r>
+              <a:rPr lang="en-US" dirty="0" err="1">
+                <a:latin typeface="Times New Roman" panose="02020603050405020304" pitchFamily="18" charset="0"/>
+                <a:cs typeface="Times New Roman" panose="02020603050405020304" pitchFamily="18" charset="0"/>
+              </a:rPr>
+              <a:t>khai</a:t>
+            </a:r>
+            <a:r>
+              <a:rPr lang="en-US" dirty="0">
+                <a:latin typeface="Times New Roman" panose="02020603050405020304" pitchFamily="18" charset="0"/>
+                <a:cs typeface="Times New Roman" panose="02020603050405020304" pitchFamily="18" charset="0"/>
+              </a:rPr>
+              <a:t> </a:t>
+            </a:r>
+            <a:r>
+              <a:rPr lang="en-US" dirty="0" err="1">
+                <a:latin typeface="Times New Roman" panose="02020603050405020304" pitchFamily="18" charset="0"/>
+                <a:cs typeface="Times New Roman" panose="02020603050405020304" pitchFamily="18" charset="0"/>
+              </a:rPr>
+              <a:t>một</a:t>
+            </a:r>
+            <a:r>
+              <a:rPr lang="en-US" dirty="0">
+                <a:latin typeface="Times New Roman" panose="02020603050405020304" pitchFamily="18" charset="0"/>
+                <a:cs typeface="Times New Roman" panose="02020603050405020304" pitchFamily="18" charset="0"/>
+              </a:rPr>
+              <a:t> Factory Service Class </a:t>
+            </a:r>
+            <a:r>
+              <a:rPr lang="en-US" dirty="0" err="1">
+                <a:latin typeface="Times New Roman" panose="02020603050405020304" pitchFamily="18" charset="0"/>
+                <a:cs typeface="Times New Roman" panose="02020603050405020304" pitchFamily="18" charset="0"/>
+              </a:rPr>
+              <a:t>để</a:t>
+            </a:r>
+            <a:r>
+              <a:rPr lang="en-US" dirty="0">
+                <a:latin typeface="Times New Roman" panose="02020603050405020304" pitchFamily="18" charset="0"/>
+                <a:cs typeface="Times New Roman" panose="02020603050405020304" pitchFamily="18" charset="0"/>
+              </a:rPr>
+              <a:t> </a:t>
+            </a:r>
+            <a:r>
+              <a:rPr lang="en-US" dirty="0" err="1">
+                <a:latin typeface="Times New Roman" panose="02020603050405020304" pitchFamily="18" charset="0"/>
+                <a:cs typeface="Times New Roman" panose="02020603050405020304" pitchFamily="18" charset="0"/>
+              </a:rPr>
+              <a:t>triển</a:t>
+            </a:r>
+            <a:r>
+              <a:rPr lang="en-US" dirty="0">
+                <a:latin typeface="Times New Roman" panose="02020603050405020304" pitchFamily="18" charset="0"/>
+                <a:cs typeface="Times New Roman" panose="02020603050405020304" pitchFamily="18" charset="0"/>
+              </a:rPr>
+              <a:t> </a:t>
+            </a:r>
+            <a:r>
+              <a:rPr lang="en-US" dirty="0" err="1">
+                <a:latin typeface="Times New Roman" panose="02020603050405020304" pitchFamily="18" charset="0"/>
+                <a:cs typeface="Times New Roman" panose="02020603050405020304" pitchFamily="18" charset="0"/>
+              </a:rPr>
+              <a:t>khai</a:t>
+            </a:r>
+            <a:r>
+              <a:rPr lang="en-US" dirty="0">
+                <a:latin typeface="Times New Roman" panose="02020603050405020304" pitchFamily="18" charset="0"/>
+                <a:cs typeface="Times New Roman" panose="02020603050405020304" pitchFamily="18" charset="0"/>
+              </a:rPr>
+              <a:t> logic </a:t>
+            </a:r>
+            <a:r>
+              <a:rPr lang="en-US" dirty="0" err="1">
+                <a:latin typeface="Times New Roman" panose="02020603050405020304" pitchFamily="18" charset="0"/>
+                <a:cs typeface="Times New Roman" panose="02020603050405020304" pitchFamily="18" charset="0"/>
+              </a:rPr>
+              <a:t>khi</a:t>
+            </a:r>
+            <a:r>
+              <a:rPr lang="en-US" dirty="0">
+                <a:latin typeface="Times New Roman" panose="02020603050405020304" pitchFamily="18" charset="0"/>
+                <a:cs typeface="Times New Roman" panose="02020603050405020304" pitchFamily="18" charset="0"/>
+              </a:rPr>
+              <a:t> </a:t>
+            </a:r>
+            <a:r>
+              <a:rPr lang="en-US" dirty="0" err="1">
+                <a:latin typeface="Times New Roman" panose="02020603050405020304" pitchFamily="18" charset="0"/>
+                <a:cs typeface="Times New Roman" panose="02020603050405020304" pitchFamily="18" charset="0"/>
+              </a:rPr>
+              <a:t>lựa</a:t>
+            </a:r>
+            <a:r>
+              <a:rPr lang="en-US" dirty="0">
+                <a:latin typeface="Times New Roman" panose="02020603050405020304" pitchFamily="18" charset="0"/>
+                <a:cs typeface="Times New Roman" panose="02020603050405020304" pitchFamily="18" charset="0"/>
+              </a:rPr>
+              <a:t> </a:t>
+            </a:r>
+            <a:r>
+              <a:rPr lang="en-US" dirty="0" err="1">
+                <a:latin typeface="Times New Roman" panose="02020603050405020304" pitchFamily="18" charset="0"/>
+                <a:cs typeface="Times New Roman" panose="02020603050405020304" pitchFamily="18" charset="0"/>
+              </a:rPr>
+              <a:t>chọn</a:t>
+            </a:r>
+            <a:r>
+              <a:rPr lang="en-US" dirty="0">
+                <a:latin typeface="Times New Roman" panose="02020603050405020304" pitchFamily="18" charset="0"/>
+                <a:cs typeface="Times New Roman" panose="02020603050405020304" pitchFamily="18" charset="0"/>
+              </a:rPr>
+              <a:t> Child Class </a:t>
+            </a:r>
+            <a:r>
+              <a:rPr lang="en-US" dirty="0" err="1">
+                <a:latin typeface="Times New Roman" panose="02020603050405020304" pitchFamily="18" charset="0"/>
+                <a:cs typeface="Times New Roman" panose="02020603050405020304" pitchFamily="18" charset="0"/>
+              </a:rPr>
+              <a:t>nào</a:t>
+            </a:r>
+            <a:r>
+              <a:rPr lang="en-US" dirty="0">
+                <a:latin typeface="Times New Roman" panose="02020603050405020304" pitchFamily="18" charset="0"/>
+                <a:cs typeface="Times New Roman" panose="02020603050405020304" pitchFamily="18" charset="0"/>
+              </a:rPr>
+              <a:t> </a:t>
+            </a:r>
+            <a:r>
+              <a:rPr lang="en-US" dirty="0" err="1">
+                <a:latin typeface="Times New Roman" panose="02020603050405020304" pitchFamily="18" charset="0"/>
+                <a:cs typeface="Times New Roman" panose="02020603050405020304" pitchFamily="18" charset="0"/>
+              </a:rPr>
+              <a:t>sẽ</a:t>
+            </a:r>
+            <a:r>
+              <a:rPr lang="en-US" dirty="0">
+                <a:latin typeface="Times New Roman" panose="02020603050405020304" pitchFamily="18" charset="0"/>
+                <a:cs typeface="Times New Roman" panose="02020603050405020304" pitchFamily="18" charset="0"/>
+              </a:rPr>
+              <a:t> đ</a:t>
+            </a:r>
+            <a:r>
+              <a:rPr lang="vi-VN" dirty="0">
+                <a:latin typeface="Times New Roman" panose="02020603050405020304" pitchFamily="18" charset="0"/>
+                <a:cs typeface="Times New Roman" panose="02020603050405020304" pitchFamily="18" charset="0"/>
+              </a:rPr>
+              <a:t>ư</a:t>
+            </a:r>
+            <a:r>
+              <a:rPr lang="en-US" dirty="0" err="1">
+                <a:latin typeface="Times New Roman" panose="02020603050405020304" pitchFamily="18" charset="0"/>
+                <a:cs typeface="Times New Roman" panose="02020603050405020304" pitchFamily="18" charset="0"/>
+              </a:rPr>
+              <a:t>ợc</a:t>
+            </a:r>
+            <a:r>
+              <a:rPr lang="en-US" dirty="0">
+                <a:latin typeface="Times New Roman" panose="02020603050405020304" pitchFamily="18" charset="0"/>
+                <a:cs typeface="Times New Roman" panose="02020603050405020304" pitchFamily="18" charset="0"/>
+              </a:rPr>
+              <a:t> </a:t>
+            </a:r>
+            <a:r>
+              <a:rPr lang="en-US" dirty="0" err="1">
+                <a:latin typeface="Times New Roman" panose="02020603050405020304" pitchFamily="18" charset="0"/>
+                <a:cs typeface="Times New Roman" panose="02020603050405020304" pitchFamily="18" charset="0"/>
+              </a:rPr>
+              <a:t>tạo</a:t>
+            </a:r>
+            <a:r>
+              <a:rPr lang="en-US" dirty="0">
+                <a:latin typeface="Times New Roman" panose="02020603050405020304" pitchFamily="18" charset="0"/>
+                <a:cs typeface="Times New Roman" panose="02020603050405020304" pitchFamily="18" charset="0"/>
+              </a:rPr>
+              <a:t> ra, </a:t>
+            </a:r>
+            <a:r>
+              <a:rPr lang="en-US" dirty="0" err="1">
+                <a:latin typeface="Times New Roman" panose="02020603050405020304" pitchFamily="18" charset="0"/>
+                <a:cs typeface="Times New Roman" panose="02020603050405020304" pitchFamily="18" charset="0"/>
+              </a:rPr>
+              <a:t>cần</a:t>
+            </a:r>
+            <a:r>
+              <a:rPr lang="en-US" dirty="0">
+                <a:latin typeface="Times New Roman" panose="02020603050405020304" pitchFamily="18" charset="0"/>
+                <a:cs typeface="Times New Roman" panose="02020603050405020304" pitchFamily="18" charset="0"/>
+              </a:rPr>
+              <a:t> </a:t>
+            </a:r>
+            <a:r>
+              <a:rPr lang="en-US" dirty="0" err="1">
+                <a:latin typeface="Times New Roman" panose="02020603050405020304" pitchFamily="18" charset="0"/>
+                <a:cs typeface="Times New Roman" panose="02020603050405020304" pitchFamily="18" charset="0"/>
+              </a:rPr>
+              <a:t>tạo</a:t>
+            </a:r>
+            <a:r>
+              <a:rPr lang="en-US" dirty="0">
+                <a:latin typeface="Times New Roman" panose="02020603050405020304" pitchFamily="18" charset="0"/>
+                <a:cs typeface="Times New Roman" panose="02020603050405020304" pitchFamily="18" charset="0"/>
+              </a:rPr>
+              <a:t> 1 static pointer </a:t>
+            </a:r>
+            <a:r>
+              <a:rPr lang="en-US" dirty="0" err="1">
+                <a:latin typeface="Times New Roman" panose="02020603050405020304" pitchFamily="18" charset="0"/>
+                <a:cs typeface="Times New Roman" panose="02020603050405020304" pitchFamily="18" charset="0"/>
+              </a:rPr>
+              <a:t>kiểu</a:t>
+            </a:r>
+            <a:r>
+              <a:rPr lang="en-US" dirty="0">
+                <a:latin typeface="Times New Roman" panose="02020603050405020304" pitchFamily="18" charset="0"/>
+                <a:cs typeface="Times New Roman" panose="02020603050405020304" pitchFamily="18" charset="0"/>
+              </a:rPr>
+              <a:t> </a:t>
+            </a:r>
+            <a:r>
+              <a:rPr lang="en-US" dirty="0" err="1">
+                <a:latin typeface="Times New Roman" panose="02020603050405020304" pitchFamily="18" charset="0"/>
+                <a:cs typeface="Times New Roman" panose="02020603050405020304" pitchFamily="18" charset="0"/>
+              </a:rPr>
+              <a:t>BaseClass</a:t>
+            </a:r>
+            <a:r>
+              <a:rPr lang="en-US" dirty="0">
+                <a:latin typeface="Times New Roman" panose="02020603050405020304" pitchFamily="18" charset="0"/>
+                <a:cs typeface="Times New Roman" panose="02020603050405020304" pitchFamily="18" charset="0"/>
+              </a:rPr>
+              <a:t> </a:t>
+            </a:r>
+            <a:r>
+              <a:rPr lang="en-US" dirty="0" err="1">
+                <a:latin typeface="Times New Roman" panose="02020603050405020304" pitchFamily="18" charset="0"/>
+                <a:cs typeface="Times New Roman" panose="02020603050405020304" pitchFamily="18" charset="0"/>
+              </a:rPr>
+              <a:t>trả</a:t>
+            </a:r>
+            <a:r>
+              <a:rPr lang="en-US" dirty="0">
+                <a:latin typeface="Times New Roman" panose="02020603050405020304" pitchFamily="18" charset="0"/>
+                <a:cs typeface="Times New Roman" panose="02020603050405020304" pitchFamily="18" charset="0"/>
+              </a:rPr>
+              <a:t> </a:t>
+            </a:r>
+            <a:r>
+              <a:rPr lang="en-US" dirty="0" err="1">
+                <a:latin typeface="Times New Roman" panose="02020603050405020304" pitchFamily="18" charset="0"/>
+                <a:cs typeface="Times New Roman" panose="02020603050405020304" pitchFamily="18" charset="0"/>
+              </a:rPr>
+              <a:t>về</a:t>
+            </a:r>
+            <a:r>
+              <a:rPr lang="en-US" dirty="0">
+                <a:latin typeface="Times New Roman" panose="02020603050405020304" pitchFamily="18" charset="0"/>
+                <a:cs typeface="Times New Roman" panose="02020603050405020304" pitchFamily="18" charset="0"/>
+              </a:rPr>
+              <a:t> </a:t>
+            </a:r>
+            <a:r>
+              <a:rPr lang="en-US" dirty="0" err="1">
+                <a:latin typeface="Times New Roman" panose="02020603050405020304" pitchFamily="18" charset="0"/>
+                <a:cs typeface="Times New Roman" panose="02020603050405020304" pitchFamily="18" charset="0"/>
+              </a:rPr>
+              <a:t>giá</a:t>
+            </a:r>
+            <a:r>
+              <a:rPr lang="en-US" dirty="0">
+                <a:latin typeface="Times New Roman" panose="02020603050405020304" pitchFamily="18" charset="0"/>
+                <a:cs typeface="Times New Roman" panose="02020603050405020304" pitchFamily="18" charset="0"/>
+              </a:rPr>
+              <a:t> </a:t>
+            </a:r>
+            <a:r>
+              <a:rPr lang="en-US" dirty="0" err="1">
+                <a:latin typeface="Times New Roman" panose="02020603050405020304" pitchFamily="18" charset="0"/>
+                <a:cs typeface="Times New Roman" panose="02020603050405020304" pitchFamily="18" charset="0"/>
+              </a:rPr>
+              <a:t>trị</a:t>
+            </a:r>
+            <a:r>
+              <a:rPr lang="en-US" dirty="0">
+                <a:latin typeface="Times New Roman" panose="02020603050405020304" pitchFamily="18" charset="0"/>
+                <a:cs typeface="Times New Roman" panose="02020603050405020304" pitchFamily="18" charset="0"/>
+              </a:rPr>
+              <a:t> new </a:t>
+            </a:r>
+            <a:r>
+              <a:rPr lang="en-US" dirty="0" err="1">
+                <a:latin typeface="Times New Roman" panose="02020603050405020304" pitchFamily="18" charset="0"/>
+                <a:cs typeface="Times New Roman" panose="02020603050405020304" pitchFamily="18" charset="0"/>
+              </a:rPr>
+              <a:t>của</a:t>
+            </a:r>
+            <a:r>
+              <a:rPr lang="en-US" dirty="0">
+                <a:latin typeface="Times New Roman" panose="02020603050405020304" pitchFamily="18" charset="0"/>
+                <a:cs typeface="Times New Roman" panose="02020603050405020304" pitchFamily="18" charset="0"/>
+              </a:rPr>
+              <a:t> </a:t>
+            </a:r>
+            <a:r>
+              <a:rPr lang="en-US" dirty="0" err="1">
+                <a:latin typeface="Times New Roman" panose="02020603050405020304" pitchFamily="18" charset="0"/>
+                <a:cs typeface="Times New Roman" panose="02020603050405020304" pitchFamily="18" charset="0"/>
+              </a:rPr>
+              <a:t>từng</a:t>
+            </a:r>
+            <a:r>
+              <a:rPr lang="en-US" dirty="0">
+                <a:latin typeface="Times New Roman" panose="02020603050405020304" pitchFamily="18" charset="0"/>
+                <a:cs typeface="Times New Roman" panose="02020603050405020304" pitchFamily="18" charset="0"/>
+              </a:rPr>
+              <a:t> Child Class, </a:t>
+            </a:r>
+            <a:r>
+              <a:rPr lang="en-US" dirty="0" err="1">
+                <a:latin typeface="Times New Roman" panose="02020603050405020304" pitchFamily="18" charset="0"/>
+                <a:cs typeface="Times New Roman" panose="02020603050405020304" pitchFamily="18" charset="0"/>
+              </a:rPr>
+              <a:t>nếu</a:t>
+            </a:r>
+            <a:r>
+              <a:rPr lang="en-US" dirty="0">
+                <a:latin typeface="Times New Roman" panose="02020603050405020304" pitchFamily="18" charset="0"/>
+                <a:cs typeface="Times New Roman" panose="02020603050405020304" pitchFamily="18" charset="0"/>
+              </a:rPr>
+              <a:t> </a:t>
+            </a:r>
+            <a:r>
+              <a:rPr lang="en-US" dirty="0" err="1">
+                <a:latin typeface="Times New Roman" panose="02020603050405020304" pitchFamily="18" charset="0"/>
+                <a:cs typeface="Times New Roman" panose="02020603050405020304" pitchFamily="18" charset="0"/>
+              </a:rPr>
+              <a:t>không</a:t>
+            </a:r>
+            <a:r>
+              <a:rPr lang="en-US" dirty="0">
+                <a:latin typeface="Times New Roman" panose="02020603050405020304" pitchFamily="18" charset="0"/>
+                <a:cs typeface="Times New Roman" panose="02020603050405020304" pitchFamily="18" charset="0"/>
+              </a:rPr>
+              <a:t> </a:t>
+            </a:r>
+            <a:r>
+              <a:rPr lang="en-US" dirty="0" err="1">
+                <a:latin typeface="Times New Roman" panose="02020603050405020304" pitchFamily="18" charset="0"/>
+                <a:cs typeface="Times New Roman" panose="02020603050405020304" pitchFamily="18" charset="0"/>
+              </a:rPr>
+              <a:t>đúng</a:t>
+            </a:r>
+            <a:r>
+              <a:rPr lang="en-US" dirty="0">
+                <a:latin typeface="Times New Roman" panose="02020603050405020304" pitchFamily="18" charset="0"/>
+                <a:cs typeface="Times New Roman" panose="02020603050405020304" pitchFamily="18" charset="0"/>
+              </a:rPr>
+              <a:t> logic </a:t>
+            </a:r>
+            <a:r>
+              <a:rPr lang="en-US" dirty="0" err="1">
+                <a:latin typeface="Times New Roman" panose="02020603050405020304" pitchFamily="18" charset="0"/>
+                <a:cs typeface="Times New Roman" panose="02020603050405020304" pitchFamily="18" charset="0"/>
+              </a:rPr>
+              <a:t>sẽ</a:t>
+            </a:r>
+            <a:r>
+              <a:rPr lang="en-US" dirty="0">
+                <a:latin typeface="Times New Roman" panose="02020603050405020304" pitchFamily="18" charset="0"/>
+                <a:cs typeface="Times New Roman" panose="02020603050405020304" pitchFamily="18" charset="0"/>
+              </a:rPr>
+              <a:t> </a:t>
+            </a:r>
+            <a:r>
+              <a:rPr lang="en-US" dirty="0" err="1">
+                <a:latin typeface="Times New Roman" panose="02020603050405020304" pitchFamily="18" charset="0"/>
+                <a:cs typeface="Times New Roman" panose="02020603050405020304" pitchFamily="18" charset="0"/>
+              </a:rPr>
+              <a:t>trả</a:t>
+            </a:r>
+            <a:r>
+              <a:rPr lang="en-US" dirty="0">
+                <a:latin typeface="Times New Roman" panose="02020603050405020304" pitchFamily="18" charset="0"/>
+                <a:cs typeface="Times New Roman" panose="02020603050405020304" pitchFamily="18" charset="0"/>
+              </a:rPr>
+              <a:t> </a:t>
+            </a:r>
+            <a:r>
+              <a:rPr lang="en-US" dirty="0" err="1">
+                <a:latin typeface="Times New Roman" panose="02020603050405020304" pitchFamily="18" charset="0"/>
+                <a:cs typeface="Times New Roman" panose="02020603050405020304" pitchFamily="18" charset="0"/>
+              </a:rPr>
+              <a:t>giá</a:t>
+            </a:r>
+            <a:r>
+              <a:rPr lang="en-US" dirty="0">
+                <a:latin typeface="Times New Roman" panose="02020603050405020304" pitchFamily="18" charset="0"/>
+                <a:cs typeface="Times New Roman" panose="02020603050405020304" pitchFamily="18" charset="0"/>
+              </a:rPr>
+              <a:t> </a:t>
+            </a:r>
+            <a:r>
+              <a:rPr lang="en-US" dirty="0" err="1">
+                <a:latin typeface="Times New Roman" panose="02020603050405020304" pitchFamily="18" charset="0"/>
+                <a:cs typeface="Times New Roman" panose="02020603050405020304" pitchFamily="18" charset="0"/>
+              </a:rPr>
+              <a:t>trị</a:t>
+            </a:r>
+            <a:r>
+              <a:rPr lang="en-US" dirty="0">
+                <a:latin typeface="Times New Roman" panose="02020603050405020304" pitchFamily="18" charset="0"/>
+                <a:cs typeface="Times New Roman" panose="02020603050405020304" pitchFamily="18" charset="0"/>
+              </a:rPr>
+              <a:t> </a:t>
+            </a:r>
+            <a:r>
+              <a:rPr lang="en-US" dirty="0" err="1">
+                <a:latin typeface="Times New Roman" panose="02020603050405020304" pitchFamily="18" charset="0"/>
+                <a:cs typeface="Times New Roman" panose="02020603050405020304" pitchFamily="18" charset="0"/>
+              </a:rPr>
+              <a:t>về</a:t>
+            </a:r>
+            <a:r>
+              <a:rPr lang="en-US" dirty="0">
+                <a:latin typeface="Times New Roman" panose="02020603050405020304" pitchFamily="18" charset="0"/>
+                <a:cs typeface="Times New Roman" panose="02020603050405020304" pitchFamily="18" charset="0"/>
+              </a:rPr>
+              <a:t> </a:t>
+            </a:r>
+            <a:r>
+              <a:rPr lang="en-US" dirty="0" err="1">
+                <a:latin typeface="Times New Roman" panose="02020603050405020304" pitchFamily="18" charset="0"/>
+                <a:cs typeface="Times New Roman" panose="02020603050405020304" pitchFamily="18" charset="0"/>
+              </a:rPr>
+              <a:t>nullptr</a:t>
+            </a:r>
+            <a:r>
+              <a:rPr lang="en-US" dirty="0">
+                <a:latin typeface="Times New Roman" panose="02020603050405020304" pitchFamily="18" charset="0"/>
+                <a:cs typeface="Times New Roman" panose="02020603050405020304" pitchFamily="18" charset="0"/>
+              </a:rPr>
+              <a:t>. </a:t>
+            </a:r>
+            <a:r>
+              <a:rPr lang="en-US" dirty="0" err="1">
+                <a:latin typeface="Times New Roman" panose="02020603050405020304" pitchFamily="18" charset="0"/>
+                <a:cs typeface="Times New Roman" panose="02020603050405020304" pitchFamily="18" charset="0"/>
+              </a:rPr>
+              <a:t>Vì</a:t>
+            </a:r>
+            <a:r>
+              <a:rPr lang="en-US" dirty="0">
+                <a:latin typeface="Times New Roman" panose="02020603050405020304" pitchFamily="18" charset="0"/>
+                <a:cs typeface="Times New Roman" panose="02020603050405020304" pitchFamily="18" charset="0"/>
+              </a:rPr>
+              <a:t> pointer đ</a:t>
+            </a:r>
+            <a:r>
+              <a:rPr lang="vi-VN" dirty="0">
+                <a:latin typeface="Times New Roman" panose="02020603050405020304" pitchFamily="18" charset="0"/>
+                <a:cs typeface="Times New Roman" panose="02020603050405020304" pitchFamily="18" charset="0"/>
+              </a:rPr>
+              <a:t>ư</a:t>
+            </a:r>
+            <a:r>
+              <a:rPr lang="en-US" dirty="0" err="1">
+                <a:latin typeface="Times New Roman" panose="02020603050405020304" pitchFamily="18" charset="0"/>
+                <a:cs typeface="Times New Roman" panose="02020603050405020304" pitchFamily="18" charset="0"/>
+              </a:rPr>
+              <a:t>ợc</a:t>
+            </a:r>
+            <a:r>
+              <a:rPr lang="en-US" dirty="0">
+                <a:latin typeface="Times New Roman" panose="02020603050405020304" pitchFamily="18" charset="0"/>
+                <a:cs typeface="Times New Roman" panose="02020603050405020304" pitchFamily="18" charset="0"/>
+              </a:rPr>
+              <a:t> </a:t>
+            </a:r>
+            <a:r>
+              <a:rPr lang="en-US" dirty="0" err="1">
+                <a:latin typeface="Times New Roman" panose="02020603050405020304" pitchFamily="18" charset="0"/>
+                <a:cs typeface="Times New Roman" panose="02020603050405020304" pitchFamily="18" charset="0"/>
+              </a:rPr>
+              <a:t>triển</a:t>
+            </a:r>
+            <a:r>
+              <a:rPr lang="en-US" dirty="0">
+                <a:latin typeface="Times New Roman" panose="02020603050405020304" pitchFamily="18" charset="0"/>
+                <a:cs typeface="Times New Roman" panose="02020603050405020304" pitchFamily="18" charset="0"/>
+              </a:rPr>
+              <a:t> </a:t>
+            </a:r>
+            <a:r>
+              <a:rPr lang="en-US" dirty="0" err="1">
+                <a:latin typeface="Times New Roman" panose="02020603050405020304" pitchFamily="18" charset="0"/>
+                <a:cs typeface="Times New Roman" panose="02020603050405020304" pitchFamily="18" charset="0"/>
+              </a:rPr>
+              <a:t>khai</a:t>
+            </a:r>
+            <a:r>
+              <a:rPr lang="en-US" dirty="0">
+                <a:latin typeface="Times New Roman" panose="02020603050405020304" pitchFamily="18" charset="0"/>
+                <a:cs typeface="Times New Roman" panose="02020603050405020304" pitchFamily="18" charset="0"/>
+              </a:rPr>
+              <a:t> </a:t>
+            </a:r>
+            <a:r>
+              <a:rPr lang="en-US" dirty="0" err="1">
+                <a:latin typeface="Times New Roman" panose="02020603050405020304" pitchFamily="18" charset="0"/>
+                <a:cs typeface="Times New Roman" panose="02020603050405020304" pitchFamily="18" charset="0"/>
+              </a:rPr>
+              <a:t>là</a:t>
+            </a:r>
+            <a:r>
+              <a:rPr lang="en-US" dirty="0">
+                <a:latin typeface="Times New Roman" panose="02020603050405020304" pitchFamily="18" charset="0"/>
+                <a:cs typeface="Times New Roman" panose="02020603050405020304" pitchFamily="18" charset="0"/>
+              </a:rPr>
+              <a:t> </a:t>
+            </a:r>
+            <a:r>
+              <a:rPr lang="en-US" dirty="0" err="1">
+                <a:latin typeface="Times New Roman" panose="02020603050405020304" pitchFamily="18" charset="0"/>
+                <a:cs typeface="Times New Roman" panose="02020603050405020304" pitchFamily="18" charset="0"/>
+              </a:rPr>
+              <a:t>hàm</a:t>
+            </a:r>
+            <a:r>
+              <a:rPr lang="en-US" dirty="0">
+                <a:latin typeface="Times New Roman" panose="02020603050405020304" pitchFamily="18" charset="0"/>
+                <a:cs typeface="Times New Roman" panose="02020603050405020304" pitchFamily="18" charset="0"/>
+              </a:rPr>
+              <a:t> </a:t>
+            </a:r>
+            <a:r>
+              <a:rPr lang="en-US" dirty="0" err="1">
+                <a:latin typeface="Times New Roman" panose="02020603050405020304" pitchFamily="18" charset="0"/>
+                <a:cs typeface="Times New Roman" panose="02020603050405020304" pitchFamily="18" charset="0"/>
+              </a:rPr>
+              <a:t>của</a:t>
+            </a:r>
+            <a:r>
+              <a:rPr lang="en-US" dirty="0">
+                <a:latin typeface="Times New Roman" panose="02020603050405020304" pitchFamily="18" charset="0"/>
+                <a:cs typeface="Times New Roman" panose="02020603050405020304" pitchFamily="18" charset="0"/>
+              </a:rPr>
+              <a:t> Factory Service </a:t>
+            </a:r>
+            <a:r>
+              <a:rPr lang="en-US" dirty="0" err="1">
+                <a:latin typeface="Times New Roman" panose="02020603050405020304" pitchFamily="18" charset="0"/>
+                <a:cs typeface="Times New Roman" panose="02020603050405020304" pitchFamily="18" charset="0"/>
+              </a:rPr>
+              <a:t>là</a:t>
+            </a:r>
+            <a:r>
+              <a:rPr lang="en-US" dirty="0">
+                <a:latin typeface="Times New Roman" panose="02020603050405020304" pitchFamily="18" charset="0"/>
+                <a:cs typeface="Times New Roman" panose="02020603050405020304" pitchFamily="18" charset="0"/>
+              </a:rPr>
+              <a:t> </a:t>
+            </a:r>
+            <a:r>
+              <a:rPr lang="en-US" dirty="0" err="1">
+                <a:latin typeface="Times New Roman" panose="02020603050405020304" pitchFamily="18" charset="0"/>
+                <a:cs typeface="Times New Roman" panose="02020603050405020304" pitchFamily="18" charset="0"/>
+              </a:rPr>
+              <a:t>một</a:t>
+            </a:r>
+            <a:r>
+              <a:rPr lang="en-US" dirty="0">
+                <a:latin typeface="Times New Roman" panose="02020603050405020304" pitchFamily="18" charset="0"/>
+                <a:cs typeface="Times New Roman" panose="02020603050405020304" pitchFamily="18" charset="0"/>
+              </a:rPr>
+              <a:t> Child Class </a:t>
+            </a:r>
+            <a:r>
+              <a:rPr lang="en-US" dirty="0" err="1">
+                <a:latin typeface="Times New Roman" panose="02020603050405020304" pitchFamily="18" charset="0"/>
+                <a:cs typeface="Times New Roman" panose="02020603050405020304" pitchFamily="18" charset="0"/>
+              </a:rPr>
+              <a:t>nên</a:t>
+            </a:r>
+            <a:r>
+              <a:rPr lang="en-US" dirty="0">
+                <a:latin typeface="Times New Roman" panose="02020603050405020304" pitchFamily="18" charset="0"/>
+                <a:cs typeface="Times New Roman" panose="02020603050405020304" pitchFamily="18" charset="0"/>
+              </a:rPr>
+              <a:t> </a:t>
+            </a:r>
+            <a:r>
+              <a:rPr lang="en-US" dirty="0" err="1">
+                <a:latin typeface="Times New Roman" panose="02020603050405020304" pitchFamily="18" charset="0"/>
+                <a:cs typeface="Times New Roman" panose="02020603050405020304" pitchFamily="18" charset="0"/>
+              </a:rPr>
+              <a:t>phải</a:t>
+            </a:r>
+            <a:r>
+              <a:rPr lang="en-US" dirty="0">
+                <a:latin typeface="Times New Roman" panose="02020603050405020304" pitchFamily="18" charset="0"/>
+                <a:cs typeface="Times New Roman" panose="02020603050405020304" pitchFamily="18" charset="0"/>
+              </a:rPr>
+              <a:t> dung </a:t>
+            </a:r>
+            <a:r>
+              <a:rPr lang="en-US" dirty="0" err="1">
+                <a:latin typeface="Times New Roman" panose="02020603050405020304" pitchFamily="18" charset="0"/>
+                <a:cs typeface="Times New Roman" panose="02020603050405020304" pitchFamily="18" charset="0"/>
+              </a:rPr>
+              <a:t>kiểu</a:t>
+            </a:r>
+            <a:r>
+              <a:rPr lang="en-US" dirty="0">
+                <a:latin typeface="Times New Roman" panose="02020603050405020304" pitchFamily="18" charset="0"/>
+                <a:cs typeface="Times New Roman" panose="02020603050405020304" pitchFamily="18" charset="0"/>
+              </a:rPr>
+              <a:t> static </a:t>
+            </a:r>
+            <a:r>
+              <a:rPr lang="en-US" dirty="0" err="1">
+                <a:latin typeface="Times New Roman" panose="02020603050405020304" pitchFamily="18" charset="0"/>
+                <a:cs typeface="Times New Roman" panose="02020603050405020304" pitchFamily="18" charset="0"/>
+              </a:rPr>
+              <a:t>để</a:t>
+            </a:r>
+            <a:r>
+              <a:rPr lang="en-US" dirty="0">
+                <a:latin typeface="Times New Roman" panose="02020603050405020304" pitchFamily="18" charset="0"/>
+                <a:cs typeface="Times New Roman" panose="02020603050405020304" pitchFamily="18" charset="0"/>
+              </a:rPr>
+              <a:t> </a:t>
+            </a:r>
+            <a:r>
+              <a:rPr lang="en-US" dirty="0" err="1">
+                <a:latin typeface="Times New Roman" panose="02020603050405020304" pitchFamily="18" charset="0"/>
+                <a:cs typeface="Times New Roman" panose="02020603050405020304" pitchFamily="18" charset="0"/>
+              </a:rPr>
+              <a:t>có</a:t>
+            </a:r>
+            <a:r>
+              <a:rPr lang="en-US" dirty="0">
+                <a:latin typeface="Times New Roman" panose="02020603050405020304" pitchFamily="18" charset="0"/>
+                <a:cs typeface="Times New Roman" panose="02020603050405020304" pitchFamily="18" charset="0"/>
+              </a:rPr>
+              <a:t> </a:t>
+            </a:r>
+            <a:r>
+              <a:rPr lang="en-US" dirty="0" err="1">
+                <a:latin typeface="Times New Roman" panose="02020603050405020304" pitchFamily="18" charset="0"/>
+                <a:cs typeface="Times New Roman" panose="02020603050405020304" pitchFamily="18" charset="0"/>
+              </a:rPr>
+              <a:t>thể</a:t>
+            </a:r>
+            <a:r>
+              <a:rPr lang="en-US" dirty="0">
+                <a:latin typeface="Times New Roman" panose="02020603050405020304" pitchFamily="18" charset="0"/>
+                <a:cs typeface="Times New Roman" panose="02020603050405020304" pitchFamily="18" charset="0"/>
+              </a:rPr>
+              <a:t> </a:t>
+            </a:r>
+            <a:r>
+              <a:rPr lang="en-US" dirty="0" err="1">
+                <a:latin typeface="Times New Roman" panose="02020603050405020304" pitchFamily="18" charset="0"/>
+                <a:cs typeface="Times New Roman" panose="02020603050405020304" pitchFamily="18" charset="0"/>
+              </a:rPr>
+              <a:t>truy</a:t>
+            </a:r>
+            <a:r>
+              <a:rPr lang="en-US" dirty="0">
+                <a:latin typeface="Times New Roman" panose="02020603050405020304" pitchFamily="18" charset="0"/>
+                <a:cs typeface="Times New Roman" panose="02020603050405020304" pitchFamily="18" charset="0"/>
+              </a:rPr>
+              <a:t> </a:t>
+            </a:r>
+            <a:r>
+              <a:rPr lang="en-US" dirty="0" err="1">
+                <a:latin typeface="Times New Roman" panose="02020603050405020304" pitchFamily="18" charset="0"/>
+                <a:cs typeface="Times New Roman" panose="02020603050405020304" pitchFamily="18" charset="0"/>
+              </a:rPr>
+              <a:t>cập</a:t>
+            </a:r>
+            <a:r>
+              <a:rPr lang="en-US" dirty="0">
+                <a:latin typeface="Times New Roman" panose="02020603050405020304" pitchFamily="18" charset="0"/>
+                <a:cs typeface="Times New Roman" panose="02020603050405020304" pitchFamily="18" charset="0"/>
+              </a:rPr>
+              <a:t> đ</a:t>
+            </a:r>
+            <a:r>
+              <a:rPr lang="vi-VN" dirty="0">
+                <a:latin typeface="Times New Roman" panose="02020603050405020304" pitchFamily="18" charset="0"/>
+                <a:cs typeface="Times New Roman" panose="02020603050405020304" pitchFamily="18" charset="0"/>
+              </a:rPr>
+              <a:t>ư</a:t>
+            </a:r>
+            <a:r>
+              <a:rPr lang="en-US" dirty="0" err="1">
+                <a:latin typeface="Times New Roman" panose="02020603050405020304" pitchFamily="18" charset="0"/>
+                <a:cs typeface="Times New Roman" panose="02020603050405020304" pitchFamily="18" charset="0"/>
+              </a:rPr>
+              <a:t>ợc</a:t>
+            </a:r>
+            <a:r>
+              <a:rPr lang="en-US" dirty="0">
+                <a:latin typeface="Times New Roman" panose="02020603050405020304" pitchFamily="18" charset="0"/>
+                <a:cs typeface="Times New Roman" panose="02020603050405020304" pitchFamily="18" charset="0"/>
+              </a:rPr>
+              <a:t> </a:t>
+            </a:r>
+            <a:r>
+              <a:rPr lang="en-US" dirty="0" err="1">
+                <a:latin typeface="Times New Roman" panose="02020603050405020304" pitchFamily="18" charset="0"/>
+                <a:cs typeface="Times New Roman" panose="02020603050405020304" pitchFamily="18" charset="0"/>
+              </a:rPr>
+              <a:t>nó</a:t>
+            </a:r>
+            <a:r>
+              <a:rPr lang="en-US" dirty="0">
+                <a:latin typeface="Times New Roman" panose="02020603050405020304" pitchFamily="18" charset="0"/>
+                <a:cs typeface="Times New Roman" panose="02020603050405020304" pitchFamily="18" charset="0"/>
+              </a:rPr>
+              <a:t> </a:t>
+            </a:r>
+            <a:r>
+              <a:rPr lang="en-US" dirty="0" err="1">
+                <a:latin typeface="Times New Roman" panose="02020603050405020304" pitchFamily="18" charset="0"/>
+                <a:cs typeface="Times New Roman" panose="02020603050405020304" pitchFamily="18" charset="0"/>
+              </a:rPr>
+              <a:t>từ</a:t>
+            </a:r>
+            <a:r>
+              <a:rPr lang="en-US" dirty="0">
+                <a:latin typeface="Times New Roman" panose="02020603050405020304" pitchFamily="18" charset="0"/>
+                <a:cs typeface="Times New Roman" panose="02020603050405020304" pitchFamily="18" charset="0"/>
+              </a:rPr>
+              <a:t> </a:t>
+            </a:r>
+            <a:r>
+              <a:rPr lang="en-US" dirty="0" err="1">
+                <a:latin typeface="Times New Roman" panose="02020603050405020304" pitchFamily="18" charset="0"/>
+                <a:cs typeface="Times New Roman" panose="02020603050405020304" pitchFamily="18" charset="0"/>
+              </a:rPr>
+              <a:t>bên</a:t>
+            </a:r>
+            <a:r>
+              <a:rPr lang="en-US" dirty="0">
+                <a:latin typeface="Times New Roman" panose="02020603050405020304" pitchFamily="18" charset="0"/>
+                <a:cs typeface="Times New Roman" panose="02020603050405020304" pitchFamily="18" charset="0"/>
+              </a:rPr>
+              <a:t> </a:t>
+            </a:r>
+            <a:r>
+              <a:rPr lang="en-US" dirty="0" err="1">
+                <a:latin typeface="Times New Roman" panose="02020603050405020304" pitchFamily="18" charset="0"/>
+                <a:cs typeface="Times New Roman" panose="02020603050405020304" pitchFamily="18" charset="0"/>
+              </a:rPr>
+              <a:t>ngoài</a:t>
+            </a:r>
+            <a:r>
+              <a:rPr lang="en-US" dirty="0">
+                <a:latin typeface="Times New Roman" panose="02020603050405020304" pitchFamily="18" charset="0"/>
+                <a:cs typeface="Times New Roman" panose="02020603050405020304" pitchFamily="18" charset="0"/>
+              </a:rPr>
+              <a:t>.</a:t>
+            </a:r>
+          </a:p>
+          <a:p>
+            <a:pPr marL="457200" lvl="1" indent="0" algn="just">
+              <a:buNone/>
+            </a:pPr>
+            <a:endParaRPr lang="en-US" dirty="0">
+              <a:latin typeface="Times New Roman" panose="02020603050405020304" pitchFamily="18" charset="0"/>
+              <a:cs typeface="Times New Roman" panose="02020603050405020304" pitchFamily="18" charset="0"/>
+            </a:endParaRPr>
+          </a:p>
+        </p:txBody>
+      </p:sp>
+    </p:spTree>
+    <p:extLst>
+      <p:ext uri="{BB962C8B-B14F-4D97-AF65-F5344CB8AC3E}">
+        <p14:creationId xmlns:p14="http://schemas.microsoft.com/office/powerpoint/2010/main" val="4000657409"/>
+      </p:ext>
+    </p:extLst>
+  </p:cSld>
+  <p:clrMapOvr>
+    <a:masterClrMapping/>
+  </p:clrMapOvr>
+</p:sld>
+</file>
+
+<file path=ppt/slides/slide12.xml><?xml version="1.0" encoding="utf-8"?>
+<p:sld xmlns:a="http://schemas.openxmlformats.org/drawingml/2006/main" xmlns:r="http://schemas.openxmlformats.org/officeDocument/2006/relationships" xmlns:p="http://schemas.openxmlformats.org/presentationml/2006/main">
+  <p:cSld>
+    <p:spTree>
+      <p:nvGrpSpPr>
+        <p:cNvPr id="1" name=""/>
+        <p:cNvGrpSpPr/>
+        <p:nvPr/>
+      </p:nvGrpSpPr>
+      <p:grpSpPr>
+        <a:xfrm>
+          <a:off x="0" y="0"/>
+          <a:ext cx="0" cy="0"/>
+          <a:chOff x="0" y="0"/>
+          <a:chExt cx="0" cy="0"/>
+        </a:xfrm>
+      </p:grpSpPr>
+      <p:pic>
+        <p:nvPicPr>
+          <p:cNvPr id="4" name="Content Placeholder 3">
+            <a:extLst>
+              <a:ext uri="{FF2B5EF4-FFF2-40B4-BE49-F238E27FC236}">
+                <a16:creationId xmlns:a16="http://schemas.microsoft.com/office/drawing/2014/main" id="{DD2A26F8-F3DA-42B8-A05B-7373FA70190A}"/>
+              </a:ext>
+            </a:extLst>
+          </p:cNvPr>
+          <p:cNvPicPr>
+            <a:picLocks noGrp="1" noChangeAspect="1"/>
+          </p:cNvPicPr>
+          <p:nvPr>
+            <p:ph idx="1"/>
+          </p:nvPr>
+        </p:nvPicPr>
+        <p:blipFill>
+          <a:blip r:embed="rId2"/>
+          <a:stretch>
+            <a:fillRect/>
+          </a:stretch>
+        </p:blipFill>
+        <p:spPr>
+          <a:xfrm>
+            <a:off x="2713703" y="-292662"/>
+            <a:ext cx="8790038" cy="7443324"/>
+          </a:xfrm>
+          <a:prstGeom prst="rect">
+            <a:avLst/>
+          </a:prstGeom>
+        </p:spPr>
+      </p:pic>
+    </p:spTree>
+    <p:extLst>
+      <p:ext uri="{BB962C8B-B14F-4D97-AF65-F5344CB8AC3E}">
+        <p14:creationId xmlns:p14="http://schemas.microsoft.com/office/powerpoint/2010/main" val="3070279167"/>
+      </p:ext>
+    </p:extLst>
+  </p:cSld>
+  <p:clrMapOvr>
+    <a:masterClrMapping/>
+  </p:clrMapOvr>
+</p:sld>
+</file>
+
+<file path=ppt/slides/slide13.xml><?xml version="1.0" encoding="utf-8"?>
+<p:sld xmlns:a="http://schemas.openxmlformats.org/drawingml/2006/main" xmlns:r="http://schemas.openxmlformats.org/officeDocument/2006/relationships" xmlns:p="http://schemas.openxmlformats.org/presentationml/2006/main">
+  <p:cSld>
+    <p:spTree>
+      <p:nvGrpSpPr>
+        <p:cNvPr id="1" name=""/>
+        <p:cNvGrpSpPr/>
+        <p:nvPr/>
+      </p:nvGrpSpPr>
+      <p:grpSpPr>
+        <a:xfrm>
+          <a:off x="0" y="0"/>
+          <a:ext cx="0" cy="0"/>
+          <a:chOff x="0" y="0"/>
+          <a:chExt cx="0" cy="0"/>
+        </a:xfrm>
+      </p:grpSpPr>
+      <p:pic>
+        <p:nvPicPr>
+          <p:cNvPr id="5" name="Content Placeholder 4">
+            <a:extLst>
+              <a:ext uri="{FF2B5EF4-FFF2-40B4-BE49-F238E27FC236}">
+                <a16:creationId xmlns:a16="http://schemas.microsoft.com/office/drawing/2014/main" id="{112AFBD7-3EEF-4F49-826D-B12CB57746C6}"/>
+              </a:ext>
+            </a:extLst>
+          </p:cNvPr>
+          <p:cNvPicPr>
+            <a:picLocks noGrp="1" noChangeAspect="1"/>
+          </p:cNvPicPr>
+          <p:nvPr>
+            <p:ph idx="1"/>
+          </p:nvPr>
+        </p:nvPicPr>
+        <p:blipFill>
+          <a:blip r:embed="rId2"/>
+          <a:stretch>
+            <a:fillRect/>
+          </a:stretch>
+        </p:blipFill>
+        <p:spPr>
+          <a:xfrm>
+            <a:off x="2869540" y="-224152"/>
+            <a:ext cx="8177001" cy="7306304"/>
+          </a:xfrm>
+          <a:prstGeom prst="rect">
+            <a:avLst/>
+          </a:prstGeom>
+        </p:spPr>
+      </p:pic>
+    </p:spTree>
+    <p:extLst>
+      <p:ext uri="{BB962C8B-B14F-4D97-AF65-F5344CB8AC3E}">
+        <p14:creationId xmlns:p14="http://schemas.microsoft.com/office/powerpoint/2010/main" val="3437833354"/>
+      </p:ext>
+    </p:extLst>
+  </p:cSld>
+  <p:clrMapOvr>
+    <a:masterClrMapping/>
+  </p:clrMapOvr>
+</p:sld>
+</file>
+
 <file path=ppt/slides/slide2.xml><?xml version="1.0" encoding="utf-8"?>
 <p:sld xmlns:a="http://schemas.openxmlformats.org/drawingml/2006/main" xmlns:r="http://schemas.openxmlformats.org/officeDocument/2006/relationships" xmlns:p="http://schemas.openxmlformats.org/presentationml/2006/main">
   <p:cSld>

</xml_diff>